<commit_message>
files as used for the manuscript
</commit_message>
<xml_diff>
--- a/all_figures.pptx
+++ b/all_figures.pptx
@@ -5,16 +5,20 @@
     <p:sldMasterId id="2147483648" r:id="rId1"/>
   </p:sldMasterIdLst>
   <p:notesMasterIdLst>
-    <p:notesMasterId r:id="rId9"/>
+    <p:notesMasterId r:id="rId13"/>
   </p:notesMasterIdLst>
   <p:sldIdLst>
     <p:sldId id="294" r:id="rId2"/>
     <p:sldId id="289" r:id="rId3"/>
     <p:sldId id="283" r:id="rId4"/>
-    <p:sldId id="285" r:id="rId5"/>
-    <p:sldId id="295" r:id="rId6"/>
-    <p:sldId id="290" r:id="rId7"/>
-    <p:sldId id="288" r:id="rId8"/>
+    <p:sldId id="296" r:id="rId5"/>
+    <p:sldId id="298" r:id="rId6"/>
+    <p:sldId id="299" r:id="rId7"/>
+    <p:sldId id="285" r:id="rId8"/>
+    <p:sldId id="295" r:id="rId9"/>
+    <p:sldId id="297" r:id="rId10"/>
+    <p:sldId id="290" r:id="rId11"/>
+    <p:sldId id="288" r:id="rId12"/>
   </p:sldIdLst>
   <p:sldSz cx="12192000" cy="6858000"/>
   <p:notesSz cx="6858000" cy="9144000"/>
@@ -572,6 +576,402 @@
     <p:extLst>
       <p:ext uri="{BB962C8B-B14F-4D97-AF65-F5344CB8AC3E}">
         <p14:creationId xmlns:p14="http://schemas.microsoft.com/office/powerpoint/2010/main" val="2865848924"/>
+      </p:ext>
+    </p:extLst>
+  </p:cSld>
+  <p:clrMapOvr>
+    <a:masterClrMapping/>
+  </p:clrMapOvr>
+</p:notes>
+</file>
+
+<file path=ppt/notesSlides/notesSlide2.xml><?xml version="1.0" encoding="utf-8"?>
+<p:notes xmlns:a="http://schemas.openxmlformats.org/drawingml/2006/main" xmlns:r="http://schemas.openxmlformats.org/officeDocument/2006/relationships" xmlns:p="http://schemas.openxmlformats.org/presentationml/2006/main">
+  <p:cSld>
+    <p:spTree>
+      <p:nvGrpSpPr>
+        <p:cNvPr id="1" name=""/>
+        <p:cNvGrpSpPr/>
+        <p:nvPr/>
+      </p:nvGrpSpPr>
+      <p:grpSpPr>
+        <a:xfrm>
+          <a:off x="0" y="0"/>
+          <a:ext cx="0" cy="0"/>
+          <a:chOff x="0" y="0"/>
+          <a:chExt cx="0" cy="0"/>
+        </a:xfrm>
+      </p:grpSpPr>
+      <p:sp>
+        <p:nvSpPr>
+          <p:cNvPr id="2" name="Slide Image Placeholder 1"/>
+          <p:cNvSpPr>
+            <a:spLocks noGrp="1" noRot="1" noChangeAspect="1"/>
+          </p:cNvSpPr>
+          <p:nvPr>
+            <p:ph type="sldImg"/>
+          </p:nvPr>
+        </p:nvSpPr>
+        <p:spPr/>
+      </p:sp>
+      <p:sp>
+        <p:nvSpPr>
+          <p:cNvPr id="3" name="Notes Placeholder 2"/>
+          <p:cNvSpPr>
+            <a:spLocks noGrp="1"/>
+          </p:cNvSpPr>
+          <p:nvPr>
+            <p:ph type="body" idx="1"/>
+          </p:nvPr>
+        </p:nvSpPr>
+        <p:spPr/>
+        <p:txBody>
+          <a:bodyPr/>
+          <a:lstStyle/>
+          <a:p>
+            <a:r>
+              <a:rPr lang="en-US" dirty="0"/>
+              <a:t>Hill</a:t>
+            </a:r>
+          </a:p>
+        </p:txBody>
+      </p:sp>
+      <p:sp>
+        <p:nvSpPr>
+          <p:cNvPr id="4" name="Slide Number Placeholder 3"/>
+          <p:cNvSpPr>
+            <a:spLocks noGrp="1"/>
+          </p:cNvSpPr>
+          <p:nvPr>
+            <p:ph type="sldNum" sz="quarter" idx="5"/>
+          </p:nvPr>
+        </p:nvSpPr>
+        <p:spPr/>
+        <p:txBody>
+          <a:bodyPr/>
+          <a:lstStyle/>
+          <a:p>
+            <a:fld id="{31B05F9A-74D0-B644-A7DA-62462AE111B2}" type="slidenum">
+              <a:rPr lang="en-US" smtClean="0"/>
+              <a:t>3</a:t>
+            </a:fld>
+            <a:endParaRPr lang="en-US"/>
+          </a:p>
+        </p:txBody>
+      </p:sp>
+    </p:spTree>
+    <p:extLst>
+      <p:ext uri="{BB962C8B-B14F-4D97-AF65-F5344CB8AC3E}">
+        <p14:creationId xmlns:p14="http://schemas.microsoft.com/office/powerpoint/2010/main" val="2376604126"/>
+      </p:ext>
+    </p:extLst>
+  </p:cSld>
+  <p:clrMapOvr>
+    <a:masterClrMapping/>
+  </p:clrMapOvr>
+</p:notes>
+</file>
+
+<file path=ppt/notesSlides/notesSlide3.xml><?xml version="1.0" encoding="utf-8"?>
+<p:notes xmlns:a="http://schemas.openxmlformats.org/drawingml/2006/main" xmlns:r="http://schemas.openxmlformats.org/officeDocument/2006/relationships" xmlns:p="http://schemas.openxmlformats.org/presentationml/2006/main">
+  <p:cSld>
+    <p:spTree>
+      <p:nvGrpSpPr>
+        <p:cNvPr id="1" name=""/>
+        <p:cNvGrpSpPr/>
+        <p:nvPr/>
+      </p:nvGrpSpPr>
+      <p:grpSpPr>
+        <a:xfrm>
+          <a:off x="0" y="0"/>
+          <a:ext cx="0" cy="0"/>
+          <a:chOff x="0" y="0"/>
+          <a:chExt cx="0" cy="0"/>
+        </a:xfrm>
+      </p:grpSpPr>
+      <p:sp>
+        <p:nvSpPr>
+          <p:cNvPr id="2" name="Slide Image Placeholder 1"/>
+          <p:cNvSpPr>
+            <a:spLocks noGrp="1" noRot="1" noChangeAspect="1"/>
+          </p:cNvSpPr>
+          <p:nvPr>
+            <p:ph type="sldImg"/>
+          </p:nvPr>
+        </p:nvSpPr>
+        <p:spPr/>
+      </p:sp>
+      <p:sp>
+        <p:nvSpPr>
+          <p:cNvPr id="3" name="Notes Placeholder 2"/>
+          <p:cNvSpPr>
+            <a:spLocks noGrp="1"/>
+          </p:cNvSpPr>
+          <p:nvPr>
+            <p:ph type="body" idx="1"/>
+          </p:nvPr>
+        </p:nvSpPr>
+        <p:spPr/>
+        <p:txBody>
+          <a:bodyPr/>
+          <a:lstStyle/>
+          <a:p>
+            <a:r>
+              <a:rPr lang="en-US" dirty="0"/>
+              <a:t>logistic</a:t>
+            </a:r>
+          </a:p>
+        </p:txBody>
+      </p:sp>
+      <p:sp>
+        <p:nvSpPr>
+          <p:cNvPr id="4" name="Slide Number Placeholder 3"/>
+          <p:cNvSpPr>
+            <a:spLocks noGrp="1"/>
+          </p:cNvSpPr>
+          <p:nvPr>
+            <p:ph type="sldNum" sz="quarter" idx="5"/>
+          </p:nvPr>
+        </p:nvSpPr>
+        <p:spPr/>
+        <p:txBody>
+          <a:bodyPr/>
+          <a:lstStyle/>
+          <a:p>
+            <a:fld id="{31B05F9A-74D0-B644-A7DA-62462AE111B2}" type="slidenum">
+              <a:rPr lang="en-US" smtClean="0"/>
+              <a:t>4</a:t>
+            </a:fld>
+            <a:endParaRPr lang="en-US"/>
+          </a:p>
+        </p:txBody>
+      </p:sp>
+    </p:spTree>
+    <p:extLst>
+      <p:ext uri="{BB962C8B-B14F-4D97-AF65-F5344CB8AC3E}">
+        <p14:creationId xmlns:p14="http://schemas.microsoft.com/office/powerpoint/2010/main" val="1142626117"/>
+      </p:ext>
+    </p:extLst>
+  </p:cSld>
+  <p:clrMapOvr>
+    <a:masterClrMapping/>
+  </p:clrMapOvr>
+</p:notes>
+</file>
+
+<file path=ppt/notesSlides/notesSlide4.xml><?xml version="1.0" encoding="utf-8"?>
+<p:notes xmlns:a="http://schemas.openxmlformats.org/drawingml/2006/main" xmlns:r="http://schemas.openxmlformats.org/officeDocument/2006/relationships" xmlns:p="http://schemas.openxmlformats.org/presentationml/2006/main">
+  <p:cSld>
+    <p:spTree>
+      <p:nvGrpSpPr>
+        <p:cNvPr id="1" name="">
+          <a:extLst>
+            <a:ext uri="{FF2B5EF4-FFF2-40B4-BE49-F238E27FC236}">
+              <a16:creationId xmlns:a16="http://schemas.microsoft.com/office/drawing/2014/main" id="{38004C44-3948-CDE6-6894-EB2D0386F083}"/>
+            </a:ext>
+          </a:extLst>
+        </p:cNvPr>
+        <p:cNvGrpSpPr/>
+        <p:nvPr/>
+      </p:nvGrpSpPr>
+      <p:grpSpPr>
+        <a:xfrm>
+          <a:off x="0" y="0"/>
+          <a:ext cx="0" cy="0"/>
+          <a:chOff x="0" y="0"/>
+          <a:chExt cx="0" cy="0"/>
+        </a:xfrm>
+      </p:grpSpPr>
+      <p:sp>
+        <p:nvSpPr>
+          <p:cNvPr id="2" name="Slide Image Placeholder 1">
+            <a:extLst>
+              <a:ext uri="{FF2B5EF4-FFF2-40B4-BE49-F238E27FC236}">
+                <a16:creationId xmlns:a16="http://schemas.microsoft.com/office/drawing/2014/main" id="{96FAB848-6091-EDBD-ABBA-815841C10946}"/>
+              </a:ext>
+            </a:extLst>
+          </p:cNvPr>
+          <p:cNvSpPr>
+            <a:spLocks noGrp="1" noRot="1" noChangeAspect="1"/>
+          </p:cNvSpPr>
+          <p:nvPr>
+            <p:ph type="sldImg"/>
+          </p:nvPr>
+        </p:nvSpPr>
+        <p:spPr/>
+      </p:sp>
+      <p:sp>
+        <p:nvSpPr>
+          <p:cNvPr id="3" name="Notes Placeholder 2">
+            <a:extLst>
+              <a:ext uri="{FF2B5EF4-FFF2-40B4-BE49-F238E27FC236}">
+                <a16:creationId xmlns:a16="http://schemas.microsoft.com/office/drawing/2014/main" id="{AB201F7B-917A-2CF2-C404-EE001A9A8966}"/>
+              </a:ext>
+            </a:extLst>
+          </p:cNvPr>
+          <p:cNvSpPr>
+            <a:spLocks noGrp="1"/>
+          </p:cNvSpPr>
+          <p:nvPr>
+            <p:ph type="body" idx="1"/>
+          </p:nvPr>
+        </p:nvSpPr>
+        <p:spPr/>
+        <p:txBody>
+          <a:bodyPr/>
+          <a:lstStyle/>
+          <a:p>
+            <a:r>
+              <a:rPr lang="en-US" dirty="0"/>
+              <a:t>Hill, SEIR, 5 days exposed on average, no transmission while exposed</a:t>
+            </a:r>
+          </a:p>
+        </p:txBody>
+      </p:sp>
+      <p:sp>
+        <p:nvSpPr>
+          <p:cNvPr id="4" name="Slide Number Placeholder 3">
+            <a:extLst>
+              <a:ext uri="{FF2B5EF4-FFF2-40B4-BE49-F238E27FC236}">
+                <a16:creationId xmlns:a16="http://schemas.microsoft.com/office/drawing/2014/main" id="{78358B01-AFA5-A50F-2711-254A9A5758AE}"/>
+              </a:ext>
+            </a:extLst>
+          </p:cNvPr>
+          <p:cNvSpPr>
+            <a:spLocks noGrp="1"/>
+          </p:cNvSpPr>
+          <p:nvPr>
+            <p:ph type="sldNum" sz="quarter" idx="5"/>
+          </p:nvPr>
+        </p:nvSpPr>
+        <p:spPr/>
+        <p:txBody>
+          <a:bodyPr/>
+          <a:lstStyle/>
+          <a:p>
+            <a:fld id="{31B05F9A-74D0-B644-A7DA-62462AE111B2}" type="slidenum">
+              <a:rPr lang="en-US" smtClean="0"/>
+              <a:t>5</a:t>
+            </a:fld>
+            <a:endParaRPr lang="en-US"/>
+          </a:p>
+        </p:txBody>
+      </p:sp>
+    </p:spTree>
+    <p:extLst>
+      <p:ext uri="{BB962C8B-B14F-4D97-AF65-F5344CB8AC3E}">
+        <p14:creationId xmlns:p14="http://schemas.microsoft.com/office/powerpoint/2010/main" val="2416053970"/>
+      </p:ext>
+    </p:extLst>
+  </p:cSld>
+  <p:clrMapOvr>
+    <a:masterClrMapping/>
+  </p:clrMapOvr>
+</p:notes>
+</file>
+
+<file path=ppt/notesSlides/notesSlide5.xml><?xml version="1.0" encoding="utf-8"?>
+<p:notes xmlns:a="http://schemas.openxmlformats.org/drawingml/2006/main" xmlns:r="http://schemas.openxmlformats.org/officeDocument/2006/relationships" xmlns:p="http://schemas.openxmlformats.org/presentationml/2006/main">
+  <p:cSld>
+    <p:spTree>
+      <p:nvGrpSpPr>
+        <p:cNvPr id="1" name="">
+          <a:extLst>
+            <a:ext uri="{FF2B5EF4-FFF2-40B4-BE49-F238E27FC236}">
+              <a16:creationId xmlns:a16="http://schemas.microsoft.com/office/drawing/2014/main" id="{2D6C5C56-060F-B898-23CC-79F673CBE213}"/>
+            </a:ext>
+          </a:extLst>
+        </p:cNvPr>
+        <p:cNvGrpSpPr/>
+        <p:nvPr/>
+      </p:nvGrpSpPr>
+      <p:grpSpPr>
+        <a:xfrm>
+          <a:off x="0" y="0"/>
+          <a:ext cx="0" cy="0"/>
+          <a:chOff x="0" y="0"/>
+          <a:chExt cx="0" cy="0"/>
+        </a:xfrm>
+      </p:grpSpPr>
+      <p:sp>
+        <p:nvSpPr>
+          <p:cNvPr id="2" name="Slide Image Placeholder 1">
+            <a:extLst>
+              <a:ext uri="{FF2B5EF4-FFF2-40B4-BE49-F238E27FC236}">
+                <a16:creationId xmlns:a16="http://schemas.microsoft.com/office/drawing/2014/main" id="{9B49E713-E545-3B66-5935-C7BFE2D3A5E0}"/>
+              </a:ext>
+            </a:extLst>
+          </p:cNvPr>
+          <p:cNvSpPr>
+            <a:spLocks noGrp="1" noRot="1" noChangeAspect="1"/>
+          </p:cNvSpPr>
+          <p:nvPr>
+            <p:ph type="sldImg"/>
+          </p:nvPr>
+        </p:nvSpPr>
+        <p:spPr/>
+      </p:sp>
+      <p:sp>
+        <p:nvSpPr>
+          <p:cNvPr id="3" name="Notes Placeholder 2">
+            <a:extLst>
+              <a:ext uri="{FF2B5EF4-FFF2-40B4-BE49-F238E27FC236}">
+                <a16:creationId xmlns:a16="http://schemas.microsoft.com/office/drawing/2014/main" id="{9C54F9F4-F532-E391-D1C8-E17F8EC28EBB}"/>
+              </a:ext>
+            </a:extLst>
+          </p:cNvPr>
+          <p:cNvSpPr>
+            <a:spLocks noGrp="1"/>
+          </p:cNvSpPr>
+          <p:nvPr>
+            <p:ph type="body" idx="1"/>
+          </p:nvPr>
+        </p:nvSpPr>
+        <p:spPr/>
+        <p:txBody>
+          <a:bodyPr/>
+          <a:lstStyle/>
+          <a:p>
+            <a:r>
+              <a:rPr lang="en-US" dirty="0"/>
+              <a:t>Hill, SEIR, 5 days exposed on average, no transmission while exposed</a:t>
+            </a:r>
+          </a:p>
+        </p:txBody>
+      </p:sp>
+      <p:sp>
+        <p:nvSpPr>
+          <p:cNvPr id="4" name="Slide Number Placeholder 3">
+            <a:extLst>
+              <a:ext uri="{FF2B5EF4-FFF2-40B4-BE49-F238E27FC236}">
+                <a16:creationId xmlns:a16="http://schemas.microsoft.com/office/drawing/2014/main" id="{3E24324A-E751-1348-161F-8D6233CFBF53}"/>
+              </a:ext>
+            </a:extLst>
+          </p:cNvPr>
+          <p:cNvSpPr>
+            <a:spLocks noGrp="1"/>
+          </p:cNvSpPr>
+          <p:nvPr>
+            <p:ph type="sldNum" sz="quarter" idx="5"/>
+          </p:nvPr>
+        </p:nvSpPr>
+        <p:spPr/>
+        <p:txBody>
+          <a:bodyPr/>
+          <a:lstStyle/>
+          <a:p>
+            <a:fld id="{31B05F9A-74D0-B644-A7DA-62462AE111B2}" type="slidenum">
+              <a:rPr lang="en-US" smtClean="0"/>
+              <a:t>6</a:t>
+            </a:fld>
+            <a:endParaRPr lang="en-US"/>
+          </a:p>
+        </p:txBody>
+      </p:sp>
+    </p:spTree>
+    <p:extLst>
+      <p:ext uri="{BB962C8B-B14F-4D97-AF65-F5344CB8AC3E}">
+        <p14:creationId xmlns:p14="http://schemas.microsoft.com/office/powerpoint/2010/main" val="1070684804"/>
       </p:ext>
     </p:extLst>
   </p:cSld>
@@ -3892,7 +4292,7 @@
         </p:blipFill>
         <p:spPr>
           <a:xfrm>
-            <a:off x="6378610" y="264843"/>
+            <a:off x="6613490" y="261922"/>
             <a:ext cx="3060700" cy="4679442"/>
           </a:xfrm>
           <a:prstGeom prst="rect">
@@ -3943,8 +4343,8 @@
         </p:nvSpPr>
         <p:spPr>
           <a:xfrm>
-            <a:off x="7488090" y="150543"/>
-            <a:ext cx="494030" cy="228600"/>
+            <a:off x="7488089" y="150543"/>
+            <a:ext cx="1219975" cy="242862"/>
           </a:xfrm>
           <a:prstGeom prst="rect">
             <a:avLst/>
@@ -4111,10 +4511,10 @@
       </p:sp>
       <p:sp>
         <p:nvSpPr>
-          <p:cNvPr id="24" name="TextBox 23">
-            <a:extLst>
-              <a:ext uri="{FF2B5EF4-FFF2-40B4-BE49-F238E27FC236}">
-                <a16:creationId xmlns:a16="http://schemas.microsoft.com/office/drawing/2014/main" id="{20C4EEF4-09C6-C44C-ECF0-BF5FF60CB7C0}"/>
+          <p:cNvPr id="26" name="TextBox 25">
+            <a:extLst>
+              <a:ext uri="{FF2B5EF4-FFF2-40B4-BE49-F238E27FC236}">
+                <a16:creationId xmlns:a16="http://schemas.microsoft.com/office/drawing/2014/main" id="{69A94B68-95DF-5A95-2FBD-9335EBC35F6E}"/>
               </a:ext>
             </a:extLst>
           </p:cNvPr>
@@ -4123,8 +4523,8 @@
         </p:nvSpPr>
         <p:spPr>
           <a:xfrm>
-            <a:off x="6413034" y="1859698"/>
-            <a:ext cx="344966" cy="369332"/>
+            <a:off x="3476074" y="2503797"/>
+            <a:ext cx="312906" cy="369332"/>
           </a:xfrm>
           <a:prstGeom prst="rect">
             <a:avLst/>
@@ -4139,17 +4539,98 @@
           <a:p>
             <a:r>
               <a:rPr lang="en-US" dirty="0"/>
-              <a:t>C</a:t>
-            </a:r>
-          </a:p>
-        </p:txBody>
-      </p:sp>
-      <p:sp>
-        <p:nvSpPr>
-          <p:cNvPr id="25" name="TextBox 24">
-            <a:extLst>
-              <a:ext uri="{FF2B5EF4-FFF2-40B4-BE49-F238E27FC236}">
-                <a16:creationId xmlns:a16="http://schemas.microsoft.com/office/drawing/2014/main" id="{F2C54D64-5F9B-BA65-420C-04E16D886743}"/>
+              <a:t>E</a:t>
+            </a:r>
+          </a:p>
+        </p:txBody>
+      </p:sp>
+      <p:sp>
+        <p:nvSpPr>
+          <p:cNvPr id="28" name="Rectangle 27">
+            <a:extLst>
+              <a:ext uri="{FF2B5EF4-FFF2-40B4-BE49-F238E27FC236}">
+                <a16:creationId xmlns:a16="http://schemas.microsoft.com/office/drawing/2014/main" id="{733F6254-6242-6B17-406A-7222F1D91ADD}"/>
+              </a:ext>
+            </a:extLst>
+          </p:cNvPr>
+          <p:cNvSpPr/>
+          <p:nvPr/>
+        </p:nvSpPr>
+        <p:spPr>
+          <a:xfrm>
+            <a:off x="6799739" y="1955937"/>
+            <a:ext cx="344966" cy="1382685"/>
+          </a:xfrm>
+          <a:prstGeom prst="rect">
+            <a:avLst/>
+          </a:prstGeom>
+          <a:solidFill>
+            <a:schemeClr val="bg1"/>
+          </a:solidFill>
+          <a:ln>
+            <a:noFill/>
+          </a:ln>
+        </p:spPr>
+        <p:style>
+          <a:lnRef idx="2">
+            <a:schemeClr val="accent1">
+              <a:shade val="15000"/>
+            </a:schemeClr>
+          </a:lnRef>
+          <a:fillRef idx="1">
+            <a:schemeClr val="accent1"/>
+          </a:fillRef>
+          <a:effectRef idx="0">
+            <a:schemeClr val="accent1"/>
+          </a:effectRef>
+          <a:fontRef idx="minor">
+            <a:schemeClr val="lt1"/>
+          </a:fontRef>
+        </p:style>
+        <p:txBody>
+          <a:bodyPr rtlCol="0" anchor="ctr"/>
+          <a:lstStyle/>
+          <a:p>
+            <a:pPr algn="ctr"/>
+            <a:endParaRPr lang="en-US"/>
+          </a:p>
+        </p:txBody>
+      </p:sp>
+      <p:pic>
+        <p:nvPicPr>
+          <p:cNvPr id="27" name="Picture 26">
+            <a:extLst>
+              <a:ext uri="{FF2B5EF4-FFF2-40B4-BE49-F238E27FC236}">
+                <a16:creationId xmlns:a16="http://schemas.microsoft.com/office/drawing/2014/main" id="{5D4C77B1-D8EE-FAA6-BD65-82EA7735DFE5}"/>
+              </a:ext>
+            </a:extLst>
+          </p:cNvPr>
+          <p:cNvPicPr>
+            <a:picLocks noChangeAspect="1"/>
+          </p:cNvPicPr>
+          <p:nvPr/>
+        </p:nvPicPr>
+        <p:blipFill>
+          <a:blip r:embed="rId2"/>
+          <a:srcRect l="7083" t="44275" r="82694" b="29797"/>
+          <a:stretch/>
+        </p:blipFill>
+        <p:spPr>
+          <a:xfrm>
+            <a:off x="6616615" y="1863932"/>
+            <a:ext cx="312906" cy="1392865"/>
+          </a:xfrm>
+          <a:prstGeom prst="rect">
+            <a:avLst/>
+          </a:prstGeom>
+        </p:spPr>
+      </p:pic>
+      <p:sp>
+        <p:nvSpPr>
+          <p:cNvPr id="24" name="TextBox 23">
+            <a:extLst>
+              <a:ext uri="{FF2B5EF4-FFF2-40B4-BE49-F238E27FC236}">
+                <a16:creationId xmlns:a16="http://schemas.microsoft.com/office/drawing/2014/main" id="{20C4EEF4-09C6-C44C-ECF0-BF5FF60CB7C0}"/>
               </a:ext>
             </a:extLst>
           </p:cNvPr>
@@ -4158,8 +4639,8 @@
         </p:nvSpPr>
         <p:spPr>
           <a:xfrm>
-            <a:off x="6413034" y="3059668"/>
-            <a:ext cx="343364" cy="369332"/>
+            <a:off x="6413034" y="1859698"/>
+            <a:ext cx="344966" cy="369332"/>
           </a:xfrm>
           <a:prstGeom prst="rect">
             <a:avLst/>
@@ -4174,17 +4655,17 @@
           <a:p>
             <a:r>
               <a:rPr lang="en-US" dirty="0"/>
-              <a:t>D</a:t>
-            </a:r>
-          </a:p>
-        </p:txBody>
-      </p:sp>
-      <p:sp>
-        <p:nvSpPr>
-          <p:cNvPr id="26" name="TextBox 25">
-            <a:extLst>
-              <a:ext uri="{FF2B5EF4-FFF2-40B4-BE49-F238E27FC236}">
-                <a16:creationId xmlns:a16="http://schemas.microsoft.com/office/drawing/2014/main" id="{69A94B68-95DF-5A95-2FBD-9335EBC35F6E}"/>
+              <a:t>C</a:t>
+            </a:r>
+          </a:p>
+        </p:txBody>
+      </p:sp>
+      <p:sp>
+        <p:nvSpPr>
+          <p:cNvPr id="25" name="TextBox 24">
+            <a:extLst>
+              <a:ext uri="{FF2B5EF4-FFF2-40B4-BE49-F238E27FC236}">
+                <a16:creationId xmlns:a16="http://schemas.microsoft.com/office/drawing/2014/main" id="{F2C54D64-5F9B-BA65-420C-04E16D886743}"/>
               </a:ext>
             </a:extLst>
           </p:cNvPr>
@@ -4193,8 +4674,8 @@
         </p:nvSpPr>
         <p:spPr>
           <a:xfrm>
-            <a:off x="3476074" y="2503797"/>
-            <a:ext cx="312906" cy="369332"/>
+            <a:off x="6413034" y="3059668"/>
+            <a:ext cx="343364" cy="369332"/>
           </a:xfrm>
           <a:prstGeom prst="rect">
             <a:avLst/>
@@ -4209,15 +4690,680 @@
           <a:p>
             <a:r>
               <a:rPr lang="en-US" dirty="0"/>
-              <a:t>E</a:t>
-            </a:r>
-          </a:p>
-        </p:txBody>
-      </p:sp>
+              <a:t>D</a:t>
+            </a:r>
+          </a:p>
+        </p:txBody>
+      </p:sp>
+      <p:sp>
+        <p:nvSpPr>
+          <p:cNvPr id="29" name="Rectangle 28">
+            <a:extLst>
+              <a:ext uri="{FF2B5EF4-FFF2-40B4-BE49-F238E27FC236}">
+                <a16:creationId xmlns:a16="http://schemas.microsoft.com/office/drawing/2014/main" id="{02DE7926-8AD6-5E32-D774-8DD6F3095E7C}"/>
+              </a:ext>
+            </a:extLst>
+          </p:cNvPr>
+          <p:cNvSpPr/>
+          <p:nvPr/>
+        </p:nvSpPr>
+        <p:spPr>
+          <a:xfrm>
+            <a:off x="6579781" y="496196"/>
+            <a:ext cx="344966" cy="1382685"/>
+          </a:xfrm>
+          <a:prstGeom prst="rect">
+            <a:avLst/>
+          </a:prstGeom>
+          <a:solidFill>
+            <a:schemeClr val="bg1"/>
+          </a:solidFill>
+          <a:ln>
+            <a:noFill/>
+          </a:ln>
+        </p:spPr>
+        <p:style>
+          <a:lnRef idx="2">
+            <a:schemeClr val="accent1">
+              <a:shade val="15000"/>
+            </a:schemeClr>
+          </a:lnRef>
+          <a:fillRef idx="1">
+            <a:schemeClr val="accent1"/>
+          </a:fillRef>
+          <a:effectRef idx="0">
+            <a:schemeClr val="accent1"/>
+          </a:effectRef>
+          <a:fontRef idx="minor">
+            <a:schemeClr val="lt1"/>
+          </a:fontRef>
+        </p:style>
+        <p:txBody>
+          <a:bodyPr rtlCol="0" anchor="ctr"/>
+          <a:lstStyle/>
+          <a:p>
+            <a:pPr algn="ctr"/>
+            <a:endParaRPr lang="en-US"/>
+          </a:p>
+        </p:txBody>
+      </p:sp>
+      <p:pic>
+        <p:nvPicPr>
+          <p:cNvPr id="30" name="Picture 29">
+            <a:extLst>
+              <a:ext uri="{FF2B5EF4-FFF2-40B4-BE49-F238E27FC236}">
+                <a16:creationId xmlns:a16="http://schemas.microsoft.com/office/drawing/2014/main" id="{3075B92F-D7D3-65A3-48A5-E33373A0CED2}"/>
+              </a:ext>
+            </a:extLst>
+          </p:cNvPr>
+          <p:cNvPicPr>
+            <a:picLocks noChangeAspect="1"/>
+          </p:cNvPicPr>
+          <p:nvPr/>
+        </p:nvPicPr>
+        <p:blipFill>
+          <a:blip r:embed="rId2"/>
+          <a:srcRect l="5350" t="12894" r="88730" b="64940"/>
+          <a:stretch/>
+        </p:blipFill>
+        <p:spPr>
+          <a:xfrm>
+            <a:off x="6661664" y="371947"/>
+            <a:ext cx="181199" cy="1190767"/>
+          </a:xfrm>
+          <a:prstGeom prst="rect">
+            <a:avLst/>
+          </a:prstGeom>
+        </p:spPr>
+      </p:pic>
     </p:spTree>
     <p:extLst>
       <p:ext uri="{BB962C8B-B14F-4D97-AF65-F5344CB8AC3E}">
         <p14:creationId xmlns:p14="http://schemas.microsoft.com/office/powerpoint/2010/main" val="3204653838"/>
+      </p:ext>
+    </p:extLst>
+  </p:cSld>
+  <p:clrMapOvr>
+    <a:masterClrMapping/>
+  </p:clrMapOvr>
+</p:sld>
+</file>
+
+<file path=ppt/slides/slide10.xml><?xml version="1.0" encoding="utf-8"?>
+<p:sld xmlns:a="http://schemas.openxmlformats.org/drawingml/2006/main" xmlns:r="http://schemas.openxmlformats.org/officeDocument/2006/relationships" xmlns:p="http://schemas.openxmlformats.org/presentationml/2006/main">
+  <p:cSld>
+    <p:spTree>
+      <p:nvGrpSpPr>
+        <p:cNvPr id="1" name="">
+          <a:extLst>
+            <a:ext uri="{FF2B5EF4-FFF2-40B4-BE49-F238E27FC236}">
+              <a16:creationId xmlns:a16="http://schemas.microsoft.com/office/drawing/2014/main" id="{13B61283-32C2-6263-E42B-38DC6D8AB404}"/>
+            </a:ext>
+          </a:extLst>
+        </p:cNvPr>
+        <p:cNvGrpSpPr/>
+        <p:nvPr/>
+      </p:nvGrpSpPr>
+      <p:grpSpPr>
+        <a:xfrm>
+          <a:off x="0" y="0"/>
+          <a:ext cx="0" cy="0"/>
+          <a:chOff x="0" y="0"/>
+          <a:chExt cx="0" cy="0"/>
+        </a:xfrm>
+      </p:grpSpPr>
+      <p:pic>
+        <p:nvPicPr>
+          <p:cNvPr id="10" name="Picture 9">
+            <a:extLst>
+              <a:ext uri="{FF2B5EF4-FFF2-40B4-BE49-F238E27FC236}">
+                <a16:creationId xmlns:a16="http://schemas.microsoft.com/office/drawing/2014/main" id="{9EB8F711-852C-2860-B218-572A0F47CA96}"/>
+              </a:ext>
+            </a:extLst>
+          </p:cNvPr>
+          <p:cNvPicPr>
+            <a:picLocks noChangeAspect="1"/>
+          </p:cNvPicPr>
+          <p:nvPr/>
+        </p:nvPicPr>
+        <p:blipFill>
+          <a:blip r:embed="rId2"/>
+          <a:srcRect l="18922"/>
+          <a:stretch/>
+        </p:blipFill>
+        <p:spPr>
+          <a:xfrm>
+            <a:off x="3098437" y="131426"/>
+            <a:ext cx="2399191" cy="2755900"/>
+          </a:xfrm>
+          <a:prstGeom prst="rect">
+            <a:avLst/>
+          </a:prstGeom>
+        </p:spPr>
+      </p:pic>
+      <p:pic>
+        <p:nvPicPr>
+          <p:cNvPr id="8" name="Picture 7">
+            <a:extLst>
+              <a:ext uri="{FF2B5EF4-FFF2-40B4-BE49-F238E27FC236}">
+                <a16:creationId xmlns:a16="http://schemas.microsoft.com/office/drawing/2014/main" id="{7166C70D-3FA5-2290-46BE-F76CD4D59C8B}"/>
+              </a:ext>
+            </a:extLst>
+          </p:cNvPr>
+          <p:cNvPicPr>
+            <a:picLocks noChangeAspect="1"/>
+          </p:cNvPicPr>
+          <p:nvPr/>
+        </p:nvPicPr>
+        <p:blipFill>
+          <a:blip r:embed="rId3"/>
+          <a:srcRect/>
+          <a:stretch/>
+        </p:blipFill>
+        <p:spPr>
+          <a:xfrm>
+            <a:off x="2439360" y="2460026"/>
+            <a:ext cx="3060700" cy="2298700"/>
+          </a:xfrm>
+          <a:prstGeom prst="rect">
+            <a:avLst/>
+          </a:prstGeom>
+        </p:spPr>
+      </p:pic>
+      <p:pic>
+        <p:nvPicPr>
+          <p:cNvPr id="5" name="Picture 4">
+            <a:extLst>
+              <a:ext uri="{FF2B5EF4-FFF2-40B4-BE49-F238E27FC236}">
+                <a16:creationId xmlns:a16="http://schemas.microsoft.com/office/drawing/2014/main" id="{05958588-694F-21DD-690D-8F26249D2919}"/>
+              </a:ext>
+            </a:extLst>
+          </p:cNvPr>
+          <p:cNvPicPr>
+            <a:picLocks noChangeAspect="1"/>
+          </p:cNvPicPr>
+          <p:nvPr/>
+        </p:nvPicPr>
+        <p:blipFill>
+          <a:blip r:embed="rId4"/>
+          <a:srcRect/>
+          <a:stretch/>
+        </p:blipFill>
+        <p:spPr>
+          <a:xfrm>
+            <a:off x="2453185" y="4363750"/>
+            <a:ext cx="3035300" cy="2298700"/>
+          </a:xfrm>
+          <a:prstGeom prst="rect">
+            <a:avLst/>
+          </a:prstGeom>
+        </p:spPr>
+      </p:pic>
+      <p:pic>
+        <p:nvPicPr>
+          <p:cNvPr id="17" name="Picture 16">
+            <a:extLst>
+              <a:ext uri="{FF2B5EF4-FFF2-40B4-BE49-F238E27FC236}">
+                <a16:creationId xmlns:a16="http://schemas.microsoft.com/office/drawing/2014/main" id="{4B3A7207-31E3-B988-6AAC-E52D81957BDF}"/>
+              </a:ext>
+            </a:extLst>
+          </p:cNvPr>
+          <p:cNvPicPr>
+            <a:picLocks noChangeAspect="1"/>
+          </p:cNvPicPr>
+          <p:nvPr/>
+        </p:nvPicPr>
+        <p:blipFill>
+          <a:blip r:embed="rId5"/>
+          <a:srcRect/>
+          <a:stretch/>
+        </p:blipFill>
+        <p:spPr>
+          <a:xfrm>
+            <a:off x="157827" y="200623"/>
+            <a:ext cx="2864932" cy="2679700"/>
+          </a:xfrm>
+          <a:prstGeom prst="rect">
+            <a:avLst/>
+          </a:prstGeom>
+        </p:spPr>
+      </p:pic>
+      <p:pic>
+        <p:nvPicPr>
+          <p:cNvPr id="15" name="Picture 14">
+            <a:extLst>
+              <a:ext uri="{FF2B5EF4-FFF2-40B4-BE49-F238E27FC236}">
+                <a16:creationId xmlns:a16="http://schemas.microsoft.com/office/drawing/2014/main" id="{EB0225C4-4C58-B286-C583-401F17D49CAD}"/>
+              </a:ext>
+            </a:extLst>
+          </p:cNvPr>
+          <p:cNvPicPr>
+            <a:picLocks noChangeAspect="1"/>
+          </p:cNvPicPr>
+          <p:nvPr/>
+        </p:nvPicPr>
+        <p:blipFill>
+          <a:blip r:embed="rId6"/>
+          <a:srcRect l="1187" r="1187"/>
+          <a:stretch/>
+        </p:blipFill>
+        <p:spPr>
+          <a:xfrm>
+            <a:off x="52570" y="2460026"/>
+            <a:ext cx="3060700" cy="2298700"/>
+          </a:xfrm>
+          <a:prstGeom prst="rect">
+            <a:avLst/>
+          </a:prstGeom>
+        </p:spPr>
+      </p:pic>
+      <p:pic>
+        <p:nvPicPr>
+          <p:cNvPr id="13" name="Picture 12">
+            <a:extLst>
+              <a:ext uri="{FF2B5EF4-FFF2-40B4-BE49-F238E27FC236}">
+                <a16:creationId xmlns:a16="http://schemas.microsoft.com/office/drawing/2014/main" id="{B49CE21C-E14C-C005-E508-F9B83A1541F7}"/>
+              </a:ext>
+            </a:extLst>
+          </p:cNvPr>
+          <p:cNvPicPr>
+            <a:picLocks noChangeAspect="1"/>
+          </p:cNvPicPr>
+          <p:nvPr/>
+        </p:nvPicPr>
+        <p:blipFill>
+          <a:blip r:embed="rId7"/>
+          <a:srcRect l="1255" r="1255"/>
+          <a:stretch/>
+        </p:blipFill>
+        <p:spPr>
+          <a:xfrm>
+            <a:off x="63500" y="4358677"/>
+            <a:ext cx="3035300" cy="2298700"/>
+          </a:xfrm>
+          <a:prstGeom prst="rect">
+            <a:avLst/>
+          </a:prstGeom>
+        </p:spPr>
+      </p:pic>
+      <p:sp>
+        <p:nvSpPr>
+          <p:cNvPr id="18" name="TextBox 17">
+            <a:extLst>
+              <a:ext uri="{FF2B5EF4-FFF2-40B4-BE49-F238E27FC236}">
+                <a16:creationId xmlns:a16="http://schemas.microsoft.com/office/drawing/2014/main" id="{C4503B02-AD4D-2356-C5CC-9219194FB197}"/>
+              </a:ext>
+            </a:extLst>
+          </p:cNvPr>
+          <p:cNvSpPr txBox="1"/>
+          <p:nvPr/>
+        </p:nvSpPr>
+        <p:spPr>
+          <a:xfrm>
+            <a:off x="708557" y="612340"/>
+            <a:ext cx="320922" cy="369332"/>
+          </a:xfrm>
+          <a:prstGeom prst="rect">
+            <a:avLst/>
+          </a:prstGeom>
+          <a:noFill/>
+        </p:spPr>
+        <p:txBody>
+          <a:bodyPr wrap="none" rtlCol="0">
+            <a:spAutoFit/>
+          </a:bodyPr>
+          <a:lstStyle/>
+          <a:p>
+            <a:r>
+              <a:rPr lang="en-US" dirty="0"/>
+              <a:t>A</a:t>
+            </a:r>
+          </a:p>
+        </p:txBody>
+      </p:sp>
+      <p:sp>
+        <p:nvSpPr>
+          <p:cNvPr id="19" name="TextBox 18">
+            <a:extLst>
+              <a:ext uri="{FF2B5EF4-FFF2-40B4-BE49-F238E27FC236}">
+                <a16:creationId xmlns:a16="http://schemas.microsoft.com/office/drawing/2014/main" id="{4CCEAD89-6018-045B-3074-1A513CF1D577}"/>
+              </a:ext>
+            </a:extLst>
+          </p:cNvPr>
+          <p:cNvSpPr txBox="1"/>
+          <p:nvPr/>
+        </p:nvSpPr>
+        <p:spPr>
+          <a:xfrm>
+            <a:off x="726677" y="2510991"/>
+            <a:ext cx="324128" cy="369332"/>
+          </a:xfrm>
+          <a:prstGeom prst="rect">
+            <a:avLst/>
+          </a:prstGeom>
+          <a:noFill/>
+        </p:spPr>
+        <p:txBody>
+          <a:bodyPr wrap="none" rtlCol="0">
+            <a:spAutoFit/>
+          </a:bodyPr>
+          <a:lstStyle/>
+          <a:p>
+            <a:r>
+              <a:rPr lang="en-US" dirty="0"/>
+              <a:t>B</a:t>
+            </a:r>
+          </a:p>
+        </p:txBody>
+      </p:sp>
+      <p:sp>
+        <p:nvSpPr>
+          <p:cNvPr id="20" name="TextBox 19">
+            <a:extLst>
+              <a:ext uri="{FF2B5EF4-FFF2-40B4-BE49-F238E27FC236}">
+                <a16:creationId xmlns:a16="http://schemas.microsoft.com/office/drawing/2014/main" id="{D73B65AE-C4E3-0C1D-8299-086CB7C5FFA3}"/>
+              </a:ext>
+            </a:extLst>
+          </p:cNvPr>
+          <p:cNvSpPr txBox="1"/>
+          <p:nvPr/>
+        </p:nvSpPr>
+        <p:spPr>
+          <a:xfrm>
+            <a:off x="708557" y="4451934"/>
+            <a:ext cx="344966" cy="369332"/>
+          </a:xfrm>
+          <a:prstGeom prst="rect">
+            <a:avLst/>
+          </a:prstGeom>
+          <a:noFill/>
+        </p:spPr>
+        <p:txBody>
+          <a:bodyPr wrap="none" rtlCol="0">
+            <a:spAutoFit/>
+          </a:bodyPr>
+          <a:lstStyle/>
+          <a:p>
+            <a:r>
+              <a:rPr lang="en-US" dirty="0"/>
+              <a:t>C</a:t>
+            </a:r>
+          </a:p>
+        </p:txBody>
+      </p:sp>
+      <p:sp>
+        <p:nvSpPr>
+          <p:cNvPr id="21" name="TextBox 20">
+            <a:extLst>
+              <a:ext uri="{FF2B5EF4-FFF2-40B4-BE49-F238E27FC236}">
+                <a16:creationId xmlns:a16="http://schemas.microsoft.com/office/drawing/2014/main" id="{5F84B059-E874-055D-D470-FD167E6489AE}"/>
+              </a:ext>
+            </a:extLst>
+          </p:cNvPr>
+          <p:cNvSpPr txBox="1"/>
+          <p:nvPr/>
+        </p:nvSpPr>
+        <p:spPr>
+          <a:xfrm>
+            <a:off x="3116726" y="619343"/>
+            <a:ext cx="343364" cy="369332"/>
+          </a:xfrm>
+          <a:prstGeom prst="rect">
+            <a:avLst/>
+          </a:prstGeom>
+          <a:noFill/>
+        </p:spPr>
+        <p:txBody>
+          <a:bodyPr wrap="none" rtlCol="0">
+            <a:spAutoFit/>
+          </a:bodyPr>
+          <a:lstStyle/>
+          <a:p>
+            <a:r>
+              <a:rPr lang="en-US" dirty="0"/>
+              <a:t>D</a:t>
+            </a:r>
+          </a:p>
+        </p:txBody>
+      </p:sp>
+      <p:sp>
+        <p:nvSpPr>
+          <p:cNvPr id="22" name="TextBox 21">
+            <a:extLst>
+              <a:ext uri="{FF2B5EF4-FFF2-40B4-BE49-F238E27FC236}">
+                <a16:creationId xmlns:a16="http://schemas.microsoft.com/office/drawing/2014/main" id="{AA8C498C-C9B1-EF1E-A638-42F208614BEE}"/>
+              </a:ext>
+            </a:extLst>
+          </p:cNvPr>
+          <p:cNvSpPr txBox="1"/>
+          <p:nvPr/>
+        </p:nvSpPr>
+        <p:spPr>
+          <a:xfrm>
+            <a:off x="3138991" y="2517994"/>
+            <a:ext cx="312906" cy="369332"/>
+          </a:xfrm>
+          <a:prstGeom prst="rect">
+            <a:avLst/>
+          </a:prstGeom>
+          <a:noFill/>
+        </p:spPr>
+        <p:txBody>
+          <a:bodyPr wrap="none" rtlCol="0">
+            <a:spAutoFit/>
+          </a:bodyPr>
+          <a:lstStyle/>
+          <a:p>
+            <a:r>
+              <a:rPr lang="en-US" dirty="0"/>
+              <a:t>E</a:t>
+            </a:r>
+          </a:p>
+        </p:txBody>
+      </p:sp>
+      <p:sp>
+        <p:nvSpPr>
+          <p:cNvPr id="23" name="TextBox 22">
+            <a:extLst>
+              <a:ext uri="{FF2B5EF4-FFF2-40B4-BE49-F238E27FC236}">
+                <a16:creationId xmlns:a16="http://schemas.microsoft.com/office/drawing/2014/main" id="{2441ECCA-AF8B-20A0-119E-9F2B3F21A37C}"/>
+              </a:ext>
+            </a:extLst>
+          </p:cNvPr>
+          <p:cNvSpPr txBox="1"/>
+          <p:nvPr/>
+        </p:nvSpPr>
+        <p:spPr>
+          <a:xfrm>
+            <a:off x="3116726" y="4445845"/>
+            <a:ext cx="306494" cy="369332"/>
+          </a:xfrm>
+          <a:prstGeom prst="rect">
+            <a:avLst/>
+          </a:prstGeom>
+          <a:noFill/>
+        </p:spPr>
+        <p:txBody>
+          <a:bodyPr wrap="none" rtlCol="0">
+            <a:spAutoFit/>
+          </a:bodyPr>
+          <a:lstStyle/>
+          <a:p>
+            <a:r>
+              <a:rPr lang="en-US" dirty="0"/>
+              <a:t>F</a:t>
+            </a:r>
+          </a:p>
+        </p:txBody>
+      </p:sp>
+    </p:spTree>
+    <p:extLst>
+      <p:ext uri="{BB962C8B-B14F-4D97-AF65-F5344CB8AC3E}">
+        <p14:creationId xmlns:p14="http://schemas.microsoft.com/office/powerpoint/2010/main" val="3489901805"/>
+      </p:ext>
+    </p:extLst>
+  </p:cSld>
+  <p:clrMapOvr>
+    <a:masterClrMapping/>
+  </p:clrMapOvr>
+</p:sld>
+</file>
+
+<file path=ppt/slides/slide11.xml><?xml version="1.0" encoding="utf-8"?>
+<p:sld xmlns:a="http://schemas.openxmlformats.org/drawingml/2006/main" xmlns:r="http://schemas.openxmlformats.org/officeDocument/2006/relationships" xmlns:p="http://schemas.openxmlformats.org/presentationml/2006/main">
+  <p:cSld>
+    <p:spTree>
+      <p:nvGrpSpPr>
+        <p:cNvPr id="1" name="">
+          <a:extLst>
+            <a:ext uri="{FF2B5EF4-FFF2-40B4-BE49-F238E27FC236}">
+              <a16:creationId xmlns:a16="http://schemas.microsoft.com/office/drawing/2014/main" id="{ACCC8AA4-794A-DA32-1C2F-F1C6E4FBCA98}"/>
+            </a:ext>
+          </a:extLst>
+        </p:cNvPr>
+        <p:cNvGrpSpPr/>
+        <p:nvPr/>
+      </p:nvGrpSpPr>
+      <p:grpSpPr>
+        <a:xfrm>
+          <a:off x="0" y="0"/>
+          <a:ext cx="0" cy="0"/>
+          <a:chOff x="0" y="0"/>
+          <a:chExt cx="0" cy="0"/>
+        </a:xfrm>
+      </p:grpSpPr>
+      <p:pic>
+        <p:nvPicPr>
+          <p:cNvPr id="12" name="Picture 11">
+            <a:extLst>
+              <a:ext uri="{FF2B5EF4-FFF2-40B4-BE49-F238E27FC236}">
+                <a16:creationId xmlns:a16="http://schemas.microsoft.com/office/drawing/2014/main" id="{25223396-7430-70AD-CA6C-809A5F3718E0}"/>
+              </a:ext>
+            </a:extLst>
+          </p:cNvPr>
+          <p:cNvPicPr>
+            <a:picLocks noChangeAspect="1"/>
+          </p:cNvPicPr>
+          <p:nvPr/>
+        </p:nvPicPr>
+        <p:blipFill>
+          <a:blip r:embed="rId2"/>
+          <a:srcRect/>
+          <a:stretch/>
+        </p:blipFill>
+        <p:spPr>
+          <a:xfrm>
+            <a:off x="1479418" y="1242472"/>
+            <a:ext cx="3340129" cy="2555463"/>
+          </a:xfrm>
+          <a:prstGeom prst="rect">
+            <a:avLst/>
+          </a:prstGeom>
+        </p:spPr>
+      </p:pic>
+      <p:pic>
+        <p:nvPicPr>
+          <p:cNvPr id="6" name="Picture 5">
+            <a:extLst>
+              <a:ext uri="{FF2B5EF4-FFF2-40B4-BE49-F238E27FC236}">
+                <a16:creationId xmlns:a16="http://schemas.microsoft.com/office/drawing/2014/main" id="{312FCA63-538A-9CC9-E37F-76263F0A85F5}"/>
+              </a:ext>
+            </a:extLst>
+          </p:cNvPr>
+          <p:cNvPicPr>
+            <a:picLocks noChangeAspect="1"/>
+          </p:cNvPicPr>
+          <p:nvPr/>
+        </p:nvPicPr>
+        <p:blipFill>
+          <a:blip r:embed="rId3"/>
+          <a:srcRect/>
+          <a:stretch/>
+        </p:blipFill>
+        <p:spPr>
+          <a:xfrm>
+            <a:off x="4887672" y="1271984"/>
+            <a:ext cx="3262980" cy="2496438"/>
+          </a:xfrm>
+          <a:prstGeom prst="rect">
+            <a:avLst/>
+          </a:prstGeom>
+        </p:spPr>
+      </p:pic>
+      <p:sp>
+        <p:nvSpPr>
+          <p:cNvPr id="2" name="TextBox 1">
+            <a:extLst>
+              <a:ext uri="{FF2B5EF4-FFF2-40B4-BE49-F238E27FC236}">
+                <a16:creationId xmlns:a16="http://schemas.microsoft.com/office/drawing/2014/main" id="{037EC741-256B-3DF7-71CE-5687AB2C6C79}"/>
+              </a:ext>
+            </a:extLst>
+          </p:cNvPr>
+          <p:cNvSpPr txBox="1"/>
+          <p:nvPr/>
+        </p:nvSpPr>
+        <p:spPr>
+          <a:xfrm>
+            <a:off x="1347385" y="1175804"/>
+            <a:ext cx="442172" cy="369332"/>
+          </a:xfrm>
+          <a:prstGeom prst="rect">
+            <a:avLst/>
+          </a:prstGeom>
+          <a:noFill/>
+        </p:spPr>
+        <p:txBody>
+          <a:bodyPr wrap="none" rtlCol="0">
+            <a:spAutoFit/>
+          </a:bodyPr>
+          <a:lstStyle/>
+          <a:p>
+            <a:r>
+              <a:rPr lang="en-US" dirty="0"/>
+              <a:t>(a)</a:t>
+            </a:r>
+          </a:p>
+        </p:txBody>
+      </p:sp>
+      <p:sp>
+        <p:nvSpPr>
+          <p:cNvPr id="4" name="TextBox 3">
+            <a:extLst>
+              <a:ext uri="{FF2B5EF4-FFF2-40B4-BE49-F238E27FC236}">
+                <a16:creationId xmlns:a16="http://schemas.microsoft.com/office/drawing/2014/main" id="{9D1F7D43-1DC4-511A-1A31-EB9202A2ECD5}"/>
+              </a:ext>
+            </a:extLst>
+          </p:cNvPr>
+          <p:cNvSpPr txBox="1"/>
+          <p:nvPr/>
+        </p:nvSpPr>
+        <p:spPr>
+          <a:xfrm>
+            <a:off x="4732124" y="1175804"/>
+            <a:ext cx="449162" cy="369332"/>
+          </a:xfrm>
+          <a:prstGeom prst="rect">
+            <a:avLst/>
+          </a:prstGeom>
+          <a:noFill/>
+        </p:spPr>
+        <p:txBody>
+          <a:bodyPr wrap="none" rtlCol="0">
+            <a:spAutoFit/>
+          </a:bodyPr>
+          <a:lstStyle/>
+          <a:p>
+            <a:r>
+              <a:rPr lang="en-US" dirty="0"/>
+              <a:t>(b)</a:t>
+            </a:r>
+          </a:p>
+        </p:txBody>
+      </p:sp>
+    </p:spTree>
+    <p:extLst>
+      <p:ext uri="{BB962C8B-B14F-4D97-AF65-F5344CB8AC3E}">
+        <p14:creationId xmlns:p14="http://schemas.microsoft.com/office/powerpoint/2010/main" val="3526566054"/>
       </p:ext>
     </p:extLst>
   </p:cSld>
@@ -4746,7 +5892,7 @@
           <p:nvPr/>
         </p:nvPicPr>
         <p:blipFill>
-          <a:blip r:embed="rId2"/>
+          <a:blip r:embed="rId3"/>
           <a:srcRect/>
           <a:stretch/>
         </p:blipFill>
@@ -4766,35 +5912,6 @@
             <a:extLst>
               <a:ext uri="{FF2B5EF4-FFF2-40B4-BE49-F238E27FC236}">
                 <a16:creationId xmlns:a16="http://schemas.microsoft.com/office/drawing/2014/main" id="{155ACD32-0B27-8510-E9AE-8DB7380E4EB5}"/>
-              </a:ext>
-            </a:extLst>
-          </p:cNvPr>
-          <p:cNvPicPr>
-            <a:picLocks noChangeAspect="1"/>
-          </p:cNvPicPr>
-          <p:nvPr/>
-        </p:nvPicPr>
-        <p:blipFill>
-          <a:blip r:embed="rId3"/>
-          <a:srcRect/>
-          <a:stretch/>
-        </p:blipFill>
-        <p:spPr>
-          <a:xfrm>
-            <a:off x="4950639" y="1167653"/>
-            <a:ext cx="3539383" cy="2705100"/>
-          </a:xfrm>
-          <a:prstGeom prst="rect">
-            <a:avLst/>
-          </a:prstGeom>
-        </p:spPr>
-      </p:pic>
-      <p:pic>
-        <p:nvPicPr>
-          <p:cNvPr id="9" name="Picture 8">
-            <a:extLst>
-              <a:ext uri="{FF2B5EF4-FFF2-40B4-BE49-F238E27FC236}">
-                <a16:creationId xmlns:a16="http://schemas.microsoft.com/office/drawing/2014/main" id="{2251F9DF-00A3-4DC5-FD0F-C906C2BC15B3}"/>
               </a:ext>
             </a:extLst>
           </p:cNvPr>
@@ -4810,6 +5927,35 @@
         </p:blipFill>
         <p:spPr>
           <a:xfrm>
+            <a:off x="4950639" y="1167653"/>
+            <a:ext cx="3539383" cy="2705100"/>
+          </a:xfrm>
+          <a:prstGeom prst="rect">
+            <a:avLst/>
+          </a:prstGeom>
+        </p:spPr>
+      </p:pic>
+      <p:pic>
+        <p:nvPicPr>
+          <p:cNvPr id="9" name="Picture 8">
+            <a:extLst>
+              <a:ext uri="{FF2B5EF4-FFF2-40B4-BE49-F238E27FC236}">
+                <a16:creationId xmlns:a16="http://schemas.microsoft.com/office/drawing/2014/main" id="{2251F9DF-00A3-4DC5-FD0F-C906C2BC15B3}"/>
+              </a:ext>
+            </a:extLst>
+          </p:cNvPr>
+          <p:cNvPicPr>
+            <a:picLocks noChangeAspect="1"/>
+          </p:cNvPicPr>
+          <p:nvPr/>
+        </p:nvPicPr>
+        <p:blipFill>
+          <a:blip r:embed="rId5"/>
+          <a:srcRect/>
+          <a:stretch/>
+        </p:blipFill>
+        <p:spPr>
+          <a:xfrm>
             <a:off x="2088722" y="3429000"/>
             <a:ext cx="3501461" cy="2705100"/>
           </a:xfrm>
@@ -4833,7 +5979,7 @@
           <p:nvPr/>
         </p:nvPicPr>
         <p:blipFill>
-          <a:blip r:embed="rId5"/>
+          <a:blip r:embed="rId6"/>
           <a:srcRect/>
           <a:stretch/>
         </p:blipFill>
@@ -5001,6 +6147,1078 @@
 </file>
 
 <file path=ppt/slides/slide4.xml><?xml version="1.0" encoding="utf-8"?>
+<p:sld xmlns:a="http://schemas.openxmlformats.org/drawingml/2006/main" xmlns:r="http://schemas.openxmlformats.org/officeDocument/2006/relationships" xmlns:p="http://schemas.openxmlformats.org/presentationml/2006/main">
+  <p:cSld>
+    <p:spTree>
+      <p:nvGrpSpPr>
+        <p:cNvPr id="1" name="">
+          <a:extLst>
+            <a:ext uri="{FF2B5EF4-FFF2-40B4-BE49-F238E27FC236}">
+              <a16:creationId xmlns:a16="http://schemas.microsoft.com/office/drawing/2014/main" id="{0626C69C-C89C-7E93-64A6-D9BD23AC696B}"/>
+            </a:ext>
+          </a:extLst>
+        </p:cNvPr>
+        <p:cNvGrpSpPr/>
+        <p:nvPr/>
+      </p:nvGrpSpPr>
+      <p:grpSpPr>
+        <a:xfrm>
+          <a:off x="0" y="0"/>
+          <a:ext cx="0" cy="0"/>
+          <a:chOff x="0" y="0"/>
+          <a:chExt cx="0" cy="0"/>
+        </a:xfrm>
+      </p:grpSpPr>
+      <p:pic>
+        <p:nvPicPr>
+          <p:cNvPr id="12" name="Picture 11">
+            <a:extLst>
+              <a:ext uri="{FF2B5EF4-FFF2-40B4-BE49-F238E27FC236}">
+                <a16:creationId xmlns:a16="http://schemas.microsoft.com/office/drawing/2014/main" id="{C7A29436-696B-DE42-2DAB-31EF97C517C5}"/>
+              </a:ext>
+            </a:extLst>
+          </p:cNvPr>
+          <p:cNvPicPr>
+            <a:picLocks noChangeAspect="1"/>
+          </p:cNvPicPr>
+          <p:nvPr/>
+        </p:nvPicPr>
+        <p:blipFill>
+          <a:blip r:embed="rId3"/>
+          <a:srcRect/>
+          <a:stretch/>
+        </p:blipFill>
+        <p:spPr>
+          <a:xfrm>
+            <a:off x="2038160" y="1167653"/>
+            <a:ext cx="3539383" cy="2705099"/>
+          </a:xfrm>
+          <a:prstGeom prst="rect">
+            <a:avLst/>
+          </a:prstGeom>
+        </p:spPr>
+      </p:pic>
+      <p:pic>
+        <p:nvPicPr>
+          <p:cNvPr id="6" name="Picture 5">
+            <a:extLst>
+              <a:ext uri="{FF2B5EF4-FFF2-40B4-BE49-F238E27FC236}">
+                <a16:creationId xmlns:a16="http://schemas.microsoft.com/office/drawing/2014/main" id="{C833E382-BF4A-6107-FC8E-B12BA247897E}"/>
+              </a:ext>
+            </a:extLst>
+          </p:cNvPr>
+          <p:cNvPicPr>
+            <a:picLocks noChangeAspect="1"/>
+          </p:cNvPicPr>
+          <p:nvPr/>
+        </p:nvPicPr>
+        <p:blipFill>
+          <a:blip r:embed="rId4"/>
+          <a:srcRect/>
+          <a:stretch/>
+        </p:blipFill>
+        <p:spPr>
+          <a:xfrm>
+            <a:off x="4950639" y="1167653"/>
+            <a:ext cx="3539383" cy="2705099"/>
+          </a:xfrm>
+          <a:prstGeom prst="rect">
+            <a:avLst/>
+          </a:prstGeom>
+        </p:spPr>
+      </p:pic>
+      <p:pic>
+        <p:nvPicPr>
+          <p:cNvPr id="9" name="Picture 8">
+            <a:extLst>
+              <a:ext uri="{FF2B5EF4-FFF2-40B4-BE49-F238E27FC236}">
+                <a16:creationId xmlns:a16="http://schemas.microsoft.com/office/drawing/2014/main" id="{84871BA3-B3EC-F47D-9B8E-262EA6C22696}"/>
+              </a:ext>
+            </a:extLst>
+          </p:cNvPr>
+          <p:cNvPicPr>
+            <a:picLocks noChangeAspect="1"/>
+          </p:cNvPicPr>
+          <p:nvPr/>
+        </p:nvPicPr>
+        <p:blipFill>
+          <a:blip r:embed="rId5"/>
+          <a:srcRect/>
+          <a:stretch/>
+        </p:blipFill>
+        <p:spPr>
+          <a:xfrm>
+            <a:off x="2046387" y="3457676"/>
+            <a:ext cx="3501461" cy="2647747"/>
+          </a:xfrm>
+          <a:prstGeom prst="rect">
+            <a:avLst/>
+          </a:prstGeom>
+        </p:spPr>
+      </p:pic>
+      <p:pic>
+        <p:nvPicPr>
+          <p:cNvPr id="3" name="Picture 2">
+            <a:extLst>
+              <a:ext uri="{FF2B5EF4-FFF2-40B4-BE49-F238E27FC236}">
+                <a16:creationId xmlns:a16="http://schemas.microsoft.com/office/drawing/2014/main" id="{307D3D1C-7353-1310-8F03-CDF018F22F07}"/>
+              </a:ext>
+            </a:extLst>
+          </p:cNvPr>
+          <p:cNvPicPr>
+            <a:picLocks noChangeAspect="1"/>
+          </p:cNvPicPr>
+          <p:nvPr/>
+        </p:nvPicPr>
+        <p:blipFill>
+          <a:blip r:embed="rId6"/>
+          <a:srcRect/>
+          <a:stretch/>
+        </p:blipFill>
+        <p:spPr>
+          <a:xfrm>
+            <a:off x="4950639" y="3415553"/>
+            <a:ext cx="3539383" cy="2705099"/>
+          </a:xfrm>
+          <a:prstGeom prst="rect">
+            <a:avLst/>
+          </a:prstGeom>
+        </p:spPr>
+      </p:pic>
+      <p:sp>
+        <p:nvSpPr>
+          <p:cNvPr id="2" name="TextBox 1">
+            <a:extLst>
+              <a:ext uri="{FF2B5EF4-FFF2-40B4-BE49-F238E27FC236}">
+                <a16:creationId xmlns:a16="http://schemas.microsoft.com/office/drawing/2014/main" id="{0CA93CEB-F50A-8B42-FDFA-862EA5F95213}"/>
+              </a:ext>
+            </a:extLst>
+          </p:cNvPr>
+          <p:cNvSpPr txBox="1"/>
+          <p:nvPr/>
+        </p:nvSpPr>
+        <p:spPr>
+          <a:xfrm>
+            <a:off x="1878753" y="1025006"/>
+            <a:ext cx="320922" cy="369332"/>
+          </a:xfrm>
+          <a:prstGeom prst="rect">
+            <a:avLst/>
+          </a:prstGeom>
+          <a:noFill/>
+        </p:spPr>
+        <p:txBody>
+          <a:bodyPr wrap="none" rtlCol="0">
+            <a:spAutoFit/>
+          </a:bodyPr>
+          <a:lstStyle/>
+          <a:p>
+            <a:r>
+              <a:rPr lang="en-US" dirty="0"/>
+              <a:t>A</a:t>
+            </a:r>
+          </a:p>
+        </p:txBody>
+      </p:sp>
+      <p:sp>
+        <p:nvSpPr>
+          <p:cNvPr id="4" name="TextBox 3">
+            <a:extLst>
+              <a:ext uri="{FF2B5EF4-FFF2-40B4-BE49-F238E27FC236}">
+                <a16:creationId xmlns:a16="http://schemas.microsoft.com/office/drawing/2014/main" id="{5FF78689-B4AD-7077-2E5B-F44811165647}"/>
+              </a:ext>
+            </a:extLst>
+          </p:cNvPr>
+          <p:cNvSpPr txBox="1"/>
+          <p:nvPr/>
+        </p:nvSpPr>
+        <p:spPr>
+          <a:xfrm>
+            <a:off x="4893458" y="1016539"/>
+            <a:ext cx="344966" cy="369332"/>
+          </a:xfrm>
+          <a:prstGeom prst="rect">
+            <a:avLst/>
+          </a:prstGeom>
+          <a:noFill/>
+        </p:spPr>
+        <p:txBody>
+          <a:bodyPr wrap="none" rtlCol="0">
+            <a:spAutoFit/>
+          </a:bodyPr>
+          <a:lstStyle/>
+          <a:p>
+            <a:r>
+              <a:rPr lang="en-US" dirty="0"/>
+              <a:t>C</a:t>
+            </a:r>
+          </a:p>
+        </p:txBody>
+      </p:sp>
+      <p:sp>
+        <p:nvSpPr>
+          <p:cNvPr id="5" name="TextBox 4">
+            <a:extLst>
+              <a:ext uri="{FF2B5EF4-FFF2-40B4-BE49-F238E27FC236}">
+                <a16:creationId xmlns:a16="http://schemas.microsoft.com/office/drawing/2014/main" id="{2CC9481E-6A23-2A2A-C7BA-71A6C28A72E1}"/>
+              </a:ext>
+            </a:extLst>
+          </p:cNvPr>
+          <p:cNvSpPr txBox="1"/>
+          <p:nvPr/>
+        </p:nvSpPr>
+        <p:spPr>
+          <a:xfrm>
+            <a:off x="1878753" y="3367125"/>
+            <a:ext cx="324128" cy="369332"/>
+          </a:xfrm>
+          <a:prstGeom prst="rect">
+            <a:avLst/>
+          </a:prstGeom>
+          <a:noFill/>
+        </p:spPr>
+        <p:txBody>
+          <a:bodyPr wrap="none" rtlCol="0">
+            <a:spAutoFit/>
+          </a:bodyPr>
+          <a:lstStyle/>
+          <a:p>
+            <a:r>
+              <a:rPr lang="en-US" dirty="0"/>
+              <a:t>B</a:t>
+            </a:r>
+          </a:p>
+        </p:txBody>
+      </p:sp>
+      <p:sp>
+        <p:nvSpPr>
+          <p:cNvPr id="7" name="TextBox 6">
+            <a:extLst>
+              <a:ext uri="{FF2B5EF4-FFF2-40B4-BE49-F238E27FC236}">
+                <a16:creationId xmlns:a16="http://schemas.microsoft.com/office/drawing/2014/main" id="{20E13ECC-E09B-D727-FEE3-8DC1610CF42A}"/>
+              </a:ext>
+            </a:extLst>
+          </p:cNvPr>
+          <p:cNvSpPr txBox="1"/>
+          <p:nvPr/>
+        </p:nvSpPr>
+        <p:spPr>
+          <a:xfrm>
+            <a:off x="4893458" y="3350880"/>
+            <a:ext cx="343364" cy="369332"/>
+          </a:xfrm>
+          <a:prstGeom prst="rect">
+            <a:avLst/>
+          </a:prstGeom>
+          <a:noFill/>
+        </p:spPr>
+        <p:txBody>
+          <a:bodyPr wrap="none" rtlCol="0">
+            <a:spAutoFit/>
+          </a:bodyPr>
+          <a:lstStyle/>
+          <a:p>
+            <a:r>
+              <a:rPr lang="en-US" dirty="0"/>
+              <a:t>D</a:t>
+            </a:r>
+          </a:p>
+        </p:txBody>
+      </p:sp>
+      <p:sp>
+        <p:nvSpPr>
+          <p:cNvPr id="8" name="TextBox 7">
+            <a:extLst>
+              <a:ext uri="{FF2B5EF4-FFF2-40B4-BE49-F238E27FC236}">
+                <a16:creationId xmlns:a16="http://schemas.microsoft.com/office/drawing/2014/main" id="{9075B833-2BA0-D528-A53F-2547F92E023D}"/>
+              </a:ext>
+            </a:extLst>
+          </p:cNvPr>
+          <p:cNvSpPr txBox="1"/>
+          <p:nvPr/>
+        </p:nvSpPr>
+        <p:spPr>
+          <a:xfrm>
+            <a:off x="8141132" y="3540862"/>
+            <a:ext cx="266420" cy="276999"/>
+          </a:xfrm>
+          <a:prstGeom prst="rect">
+            <a:avLst/>
+          </a:prstGeom>
+          <a:noFill/>
+        </p:spPr>
+        <p:txBody>
+          <a:bodyPr wrap="none" rtlCol="0">
+            <a:spAutoFit/>
+          </a:bodyPr>
+          <a:lstStyle/>
+          <a:p>
+            <a:r>
+              <a:rPr lang="en-US" sz="1200" dirty="0"/>
+              <a:t>+</a:t>
+            </a:r>
+          </a:p>
+        </p:txBody>
+      </p:sp>
+      <p:sp>
+        <p:nvSpPr>
+          <p:cNvPr id="10" name="TextBox 9">
+            <a:extLst>
+              <a:ext uri="{FF2B5EF4-FFF2-40B4-BE49-F238E27FC236}">
+                <a16:creationId xmlns:a16="http://schemas.microsoft.com/office/drawing/2014/main" id="{98EE3FD7-FDE5-17F7-A729-1BC362C04801}"/>
+              </a:ext>
+            </a:extLst>
+          </p:cNvPr>
+          <p:cNvSpPr txBox="1"/>
+          <p:nvPr/>
+        </p:nvSpPr>
+        <p:spPr>
+          <a:xfrm>
+            <a:off x="8145587" y="1296261"/>
+            <a:ext cx="266420" cy="276999"/>
+          </a:xfrm>
+          <a:prstGeom prst="rect">
+            <a:avLst/>
+          </a:prstGeom>
+          <a:noFill/>
+        </p:spPr>
+        <p:txBody>
+          <a:bodyPr wrap="none" rtlCol="0">
+            <a:spAutoFit/>
+          </a:bodyPr>
+          <a:lstStyle/>
+          <a:p>
+            <a:r>
+              <a:rPr lang="en-US" sz="1200" dirty="0"/>
+              <a:t>+</a:t>
+            </a:r>
+          </a:p>
+        </p:txBody>
+      </p:sp>
+    </p:spTree>
+    <p:extLst>
+      <p:ext uri="{BB962C8B-B14F-4D97-AF65-F5344CB8AC3E}">
+        <p14:creationId xmlns:p14="http://schemas.microsoft.com/office/powerpoint/2010/main" val="4253710007"/>
+      </p:ext>
+    </p:extLst>
+  </p:cSld>
+  <p:clrMapOvr>
+    <a:masterClrMapping/>
+  </p:clrMapOvr>
+</p:sld>
+</file>
+
+<file path=ppt/slides/slide5.xml><?xml version="1.0" encoding="utf-8"?>
+<p:sld xmlns:a="http://schemas.openxmlformats.org/drawingml/2006/main" xmlns:r="http://schemas.openxmlformats.org/officeDocument/2006/relationships" xmlns:p="http://schemas.openxmlformats.org/presentationml/2006/main">
+  <p:cSld>
+    <p:spTree>
+      <p:nvGrpSpPr>
+        <p:cNvPr id="1" name="">
+          <a:extLst>
+            <a:ext uri="{FF2B5EF4-FFF2-40B4-BE49-F238E27FC236}">
+              <a16:creationId xmlns:a16="http://schemas.microsoft.com/office/drawing/2014/main" id="{F1F1C5C6-4986-361A-6E64-2BBB688596B7}"/>
+            </a:ext>
+          </a:extLst>
+        </p:cNvPr>
+        <p:cNvGrpSpPr/>
+        <p:nvPr/>
+      </p:nvGrpSpPr>
+      <p:grpSpPr>
+        <a:xfrm>
+          <a:off x="0" y="0"/>
+          <a:ext cx="0" cy="0"/>
+          <a:chOff x="0" y="0"/>
+          <a:chExt cx="0" cy="0"/>
+        </a:xfrm>
+      </p:grpSpPr>
+      <p:pic>
+        <p:nvPicPr>
+          <p:cNvPr id="12" name="Picture 11">
+            <a:extLst>
+              <a:ext uri="{FF2B5EF4-FFF2-40B4-BE49-F238E27FC236}">
+                <a16:creationId xmlns:a16="http://schemas.microsoft.com/office/drawing/2014/main" id="{B518878E-12DC-7E99-6220-BA4E7783C38C}"/>
+              </a:ext>
+            </a:extLst>
+          </p:cNvPr>
+          <p:cNvPicPr>
+            <a:picLocks noChangeAspect="1"/>
+          </p:cNvPicPr>
+          <p:nvPr/>
+        </p:nvPicPr>
+        <p:blipFill>
+          <a:blip r:embed="rId3"/>
+          <a:srcRect/>
+          <a:stretch/>
+        </p:blipFill>
+        <p:spPr>
+          <a:xfrm>
+            <a:off x="2038160" y="1173973"/>
+            <a:ext cx="3539383" cy="2692459"/>
+          </a:xfrm>
+          <a:prstGeom prst="rect">
+            <a:avLst/>
+          </a:prstGeom>
+        </p:spPr>
+      </p:pic>
+      <p:pic>
+        <p:nvPicPr>
+          <p:cNvPr id="6" name="Picture 5">
+            <a:extLst>
+              <a:ext uri="{FF2B5EF4-FFF2-40B4-BE49-F238E27FC236}">
+                <a16:creationId xmlns:a16="http://schemas.microsoft.com/office/drawing/2014/main" id="{E6A3B7EE-CDDD-83E5-9745-581E56975A2C}"/>
+              </a:ext>
+            </a:extLst>
+          </p:cNvPr>
+          <p:cNvPicPr>
+            <a:picLocks noChangeAspect="1"/>
+          </p:cNvPicPr>
+          <p:nvPr/>
+        </p:nvPicPr>
+        <p:blipFill>
+          <a:blip r:embed="rId4"/>
+          <a:srcRect/>
+          <a:stretch/>
+        </p:blipFill>
+        <p:spPr>
+          <a:xfrm>
+            <a:off x="4950639" y="1173973"/>
+            <a:ext cx="3539383" cy="2692459"/>
+          </a:xfrm>
+          <a:prstGeom prst="rect">
+            <a:avLst/>
+          </a:prstGeom>
+        </p:spPr>
+      </p:pic>
+      <p:pic>
+        <p:nvPicPr>
+          <p:cNvPr id="9" name="Picture 8">
+            <a:extLst>
+              <a:ext uri="{FF2B5EF4-FFF2-40B4-BE49-F238E27FC236}">
+                <a16:creationId xmlns:a16="http://schemas.microsoft.com/office/drawing/2014/main" id="{A1256AA1-42AE-89E5-3CFC-0F273D1B0B91}"/>
+              </a:ext>
+            </a:extLst>
+          </p:cNvPr>
+          <p:cNvPicPr>
+            <a:picLocks noChangeAspect="1"/>
+          </p:cNvPicPr>
+          <p:nvPr/>
+        </p:nvPicPr>
+        <p:blipFill>
+          <a:blip r:embed="rId5"/>
+          <a:srcRect/>
+          <a:stretch/>
+        </p:blipFill>
+        <p:spPr>
+          <a:xfrm>
+            <a:off x="2075459" y="3412486"/>
+            <a:ext cx="3502083" cy="2692938"/>
+          </a:xfrm>
+          <a:prstGeom prst="rect">
+            <a:avLst/>
+          </a:prstGeom>
+        </p:spPr>
+      </p:pic>
+      <p:pic>
+        <p:nvPicPr>
+          <p:cNvPr id="3" name="Picture 2">
+            <a:extLst>
+              <a:ext uri="{FF2B5EF4-FFF2-40B4-BE49-F238E27FC236}">
+                <a16:creationId xmlns:a16="http://schemas.microsoft.com/office/drawing/2014/main" id="{CE466766-50C2-588C-C4A5-29EE632DFAE8}"/>
+              </a:ext>
+            </a:extLst>
+          </p:cNvPr>
+          <p:cNvPicPr>
+            <a:picLocks noChangeAspect="1"/>
+          </p:cNvPicPr>
+          <p:nvPr/>
+        </p:nvPicPr>
+        <p:blipFill>
+          <a:blip r:embed="rId6"/>
+          <a:srcRect/>
+          <a:stretch/>
+        </p:blipFill>
+        <p:spPr>
+          <a:xfrm>
+            <a:off x="4950639" y="3421873"/>
+            <a:ext cx="3539383" cy="2692459"/>
+          </a:xfrm>
+          <a:prstGeom prst="rect">
+            <a:avLst/>
+          </a:prstGeom>
+        </p:spPr>
+      </p:pic>
+      <p:sp>
+        <p:nvSpPr>
+          <p:cNvPr id="2" name="TextBox 1">
+            <a:extLst>
+              <a:ext uri="{FF2B5EF4-FFF2-40B4-BE49-F238E27FC236}">
+                <a16:creationId xmlns:a16="http://schemas.microsoft.com/office/drawing/2014/main" id="{5BDB3525-5C15-BD4C-2B25-206D85F8A2C8}"/>
+              </a:ext>
+            </a:extLst>
+          </p:cNvPr>
+          <p:cNvSpPr txBox="1"/>
+          <p:nvPr/>
+        </p:nvSpPr>
+        <p:spPr>
+          <a:xfrm>
+            <a:off x="1878753" y="1025006"/>
+            <a:ext cx="320922" cy="369332"/>
+          </a:xfrm>
+          <a:prstGeom prst="rect">
+            <a:avLst/>
+          </a:prstGeom>
+          <a:noFill/>
+        </p:spPr>
+        <p:txBody>
+          <a:bodyPr wrap="none" rtlCol="0">
+            <a:spAutoFit/>
+          </a:bodyPr>
+          <a:lstStyle/>
+          <a:p>
+            <a:r>
+              <a:rPr lang="en-US" dirty="0"/>
+              <a:t>A</a:t>
+            </a:r>
+          </a:p>
+        </p:txBody>
+      </p:sp>
+      <p:sp>
+        <p:nvSpPr>
+          <p:cNvPr id="4" name="TextBox 3">
+            <a:extLst>
+              <a:ext uri="{FF2B5EF4-FFF2-40B4-BE49-F238E27FC236}">
+                <a16:creationId xmlns:a16="http://schemas.microsoft.com/office/drawing/2014/main" id="{DDA16D9B-886A-F511-E6D3-F9996A927404}"/>
+              </a:ext>
+            </a:extLst>
+          </p:cNvPr>
+          <p:cNvSpPr txBox="1"/>
+          <p:nvPr/>
+        </p:nvSpPr>
+        <p:spPr>
+          <a:xfrm>
+            <a:off x="4893458" y="1016539"/>
+            <a:ext cx="344966" cy="369332"/>
+          </a:xfrm>
+          <a:prstGeom prst="rect">
+            <a:avLst/>
+          </a:prstGeom>
+          <a:noFill/>
+        </p:spPr>
+        <p:txBody>
+          <a:bodyPr wrap="none" rtlCol="0">
+            <a:spAutoFit/>
+          </a:bodyPr>
+          <a:lstStyle/>
+          <a:p>
+            <a:r>
+              <a:rPr lang="en-US" dirty="0"/>
+              <a:t>C</a:t>
+            </a:r>
+          </a:p>
+        </p:txBody>
+      </p:sp>
+      <p:sp>
+        <p:nvSpPr>
+          <p:cNvPr id="5" name="TextBox 4">
+            <a:extLst>
+              <a:ext uri="{FF2B5EF4-FFF2-40B4-BE49-F238E27FC236}">
+                <a16:creationId xmlns:a16="http://schemas.microsoft.com/office/drawing/2014/main" id="{E092111C-DEC3-97C7-EB46-D4E56D48AF22}"/>
+              </a:ext>
+            </a:extLst>
+          </p:cNvPr>
+          <p:cNvSpPr txBox="1"/>
+          <p:nvPr/>
+        </p:nvSpPr>
+        <p:spPr>
+          <a:xfrm>
+            <a:off x="1878753" y="3367125"/>
+            <a:ext cx="324128" cy="369332"/>
+          </a:xfrm>
+          <a:prstGeom prst="rect">
+            <a:avLst/>
+          </a:prstGeom>
+          <a:noFill/>
+        </p:spPr>
+        <p:txBody>
+          <a:bodyPr wrap="none" rtlCol="0">
+            <a:spAutoFit/>
+          </a:bodyPr>
+          <a:lstStyle/>
+          <a:p>
+            <a:r>
+              <a:rPr lang="en-US" dirty="0"/>
+              <a:t>B</a:t>
+            </a:r>
+          </a:p>
+        </p:txBody>
+      </p:sp>
+      <p:sp>
+        <p:nvSpPr>
+          <p:cNvPr id="7" name="TextBox 6">
+            <a:extLst>
+              <a:ext uri="{FF2B5EF4-FFF2-40B4-BE49-F238E27FC236}">
+                <a16:creationId xmlns:a16="http://schemas.microsoft.com/office/drawing/2014/main" id="{38574B31-E120-2EA1-0479-908E00B1FA26}"/>
+              </a:ext>
+            </a:extLst>
+          </p:cNvPr>
+          <p:cNvSpPr txBox="1"/>
+          <p:nvPr/>
+        </p:nvSpPr>
+        <p:spPr>
+          <a:xfrm>
+            <a:off x="4893458" y="3350880"/>
+            <a:ext cx="343364" cy="369332"/>
+          </a:xfrm>
+          <a:prstGeom prst="rect">
+            <a:avLst/>
+          </a:prstGeom>
+          <a:noFill/>
+        </p:spPr>
+        <p:txBody>
+          <a:bodyPr wrap="none" rtlCol="0">
+            <a:spAutoFit/>
+          </a:bodyPr>
+          <a:lstStyle/>
+          <a:p>
+            <a:r>
+              <a:rPr lang="en-US" dirty="0"/>
+              <a:t>D</a:t>
+            </a:r>
+          </a:p>
+        </p:txBody>
+      </p:sp>
+    </p:spTree>
+    <p:extLst>
+      <p:ext uri="{BB962C8B-B14F-4D97-AF65-F5344CB8AC3E}">
+        <p14:creationId xmlns:p14="http://schemas.microsoft.com/office/powerpoint/2010/main" val="2416743074"/>
+      </p:ext>
+    </p:extLst>
+  </p:cSld>
+  <p:clrMapOvr>
+    <a:masterClrMapping/>
+  </p:clrMapOvr>
+</p:sld>
+</file>
+
+<file path=ppt/slides/slide6.xml><?xml version="1.0" encoding="utf-8"?>
+<p:sld xmlns:a="http://schemas.openxmlformats.org/drawingml/2006/main" xmlns:r="http://schemas.openxmlformats.org/officeDocument/2006/relationships" xmlns:p="http://schemas.openxmlformats.org/presentationml/2006/main">
+  <p:cSld>
+    <p:spTree>
+      <p:nvGrpSpPr>
+        <p:cNvPr id="1" name="">
+          <a:extLst>
+            <a:ext uri="{FF2B5EF4-FFF2-40B4-BE49-F238E27FC236}">
+              <a16:creationId xmlns:a16="http://schemas.microsoft.com/office/drawing/2014/main" id="{5F63EE91-6EA6-CCDF-DFAA-12FCFC7DD1A6}"/>
+            </a:ext>
+          </a:extLst>
+        </p:cNvPr>
+        <p:cNvGrpSpPr/>
+        <p:nvPr/>
+      </p:nvGrpSpPr>
+      <p:grpSpPr>
+        <a:xfrm>
+          <a:off x="0" y="0"/>
+          <a:ext cx="0" cy="0"/>
+          <a:chOff x="0" y="0"/>
+          <a:chExt cx="0" cy="0"/>
+        </a:xfrm>
+      </p:grpSpPr>
+      <p:pic>
+        <p:nvPicPr>
+          <p:cNvPr id="27" name="Picture 26">
+            <a:extLst>
+              <a:ext uri="{FF2B5EF4-FFF2-40B4-BE49-F238E27FC236}">
+                <a16:creationId xmlns:a16="http://schemas.microsoft.com/office/drawing/2014/main" id="{22850344-01F3-13A1-3E2E-F7F213103817}"/>
+              </a:ext>
+            </a:extLst>
+          </p:cNvPr>
+          <p:cNvPicPr>
+            <a:picLocks noChangeAspect="1"/>
+          </p:cNvPicPr>
+          <p:nvPr/>
+        </p:nvPicPr>
+        <p:blipFill>
+          <a:blip r:embed="rId3"/>
+          <a:stretch>
+            <a:fillRect/>
+          </a:stretch>
+        </p:blipFill>
+        <p:spPr>
+          <a:xfrm>
+            <a:off x="8549168" y="2411893"/>
+            <a:ext cx="2260600" cy="2336800"/>
+          </a:xfrm>
+          <a:prstGeom prst="rect">
+            <a:avLst/>
+          </a:prstGeom>
+        </p:spPr>
+      </p:pic>
+      <p:pic>
+        <p:nvPicPr>
+          <p:cNvPr id="25" name="Picture 24">
+            <a:extLst>
+              <a:ext uri="{FF2B5EF4-FFF2-40B4-BE49-F238E27FC236}">
+                <a16:creationId xmlns:a16="http://schemas.microsoft.com/office/drawing/2014/main" id="{E46FC39C-7561-B0AE-FFAE-5B161550D3D1}"/>
+              </a:ext>
+            </a:extLst>
+          </p:cNvPr>
+          <p:cNvPicPr>
+            <a:picLocks noChangeAspect="1"/>
+          </p:cNvPicPr>
+          <p:nvPr/>
+        </p:nvPicPr>
+        <p:blipFill>
+          <a:blip r:embed="rId4"/>
+          <a:stretch>
+            <a:fillRect/>
+          </a:stretch>
+        </p:blipFill>
+        <p:spPr>
+          <a:xfrm>
+            <a:off x="6994308" y="2411893"/>
+            <a:ext cx="2222500" cy="2336800"/>
+          </a:xfrm>
+          <a:prstGeom prst="rect">
+            <a:avLst/>
+          </a:prstGeom>
+        </p:spPr>
+      </p:pic>
+      <p:pic>
+        <p:nvPicPr>
+          <p:cNvPr id="23" name="Picture 22">
+            <a:extLst>
+              <a:ext uri="{FF2B5EF4-FFF2-40B4-BE49-F238E27FC236}">
+                <a16:creationId xmlns:a16="http://schemas.microsoft.com/office/drawing/2014/main" id="{36612B32-FE95-FCE1-AD80-2C6ED654017B}"/>
+              </a:ext>
+            </a:extLst>
+          </p:cNvPr>
+          <p:cNvPicPr>
+            <a:picLocks noChangeAspect="1"/>
+          </p:cNvPicPr>
+          <p:nvPr/>
+        </p:nvPicPr>
+        <p:blipFill>
+          <a:blip r:embed="rId5"/>
+          <a:stretch>
+            <a:fillRect/>
+          </a:stretch>
+        </p:blipFill>
+        <p:spPr>
+          <a:xfrm>
+            <a:off x="5441947" y="2411893"/>
+            <a:ext cx="2222500" cy="2336800"/>
+          </a:xfrm>
+          <a:prstGeom prst="rect">
+            <a:avLst/>
+          </a:prstGeom>
+        </p:spPr>
+      </p:pic>
+      <p:pic>
+        <p:nvPicPr>
+          <p:cNvPr id="21" name="Picture 20">
+            <a:extLst>
+              <a:ext uri="{FF2B5EF4-FFF2-40B4-BE49-F238E27FC236}">
+                <a16:creationId xmlns:a16="http://schemas.microsoft.com/office/drawing/2014/main" id="{0BEC71FE-1D46-2668-D96B-BE5D66532A49}"/>
+              </a:ext>
+            </a:extLst>
+          </p:cNvPr>
+          <p:cNvPicPr>
+            <a:picLocks noChangeAspect="1"/>
+          </p:cNvPicPr>
+          <p:nvPr/>
+        </p:nvPicPr>
+        <p:blipFill>
+          <a:blip r:embed="rId6"/>
+          <a:stretch>
+            <a:fillRect/>
+          </a:stretch>
+        </p:blipFill>
+        <p:spPr>
+          <a:xfrm>
+            <a:off x="3889299" y="2411893"/>
+            <a:ext cx="2222500" cy="2336800"/>
+          </a:xfrm>
+          <a:prstGeom prst="rect">
+            <a:avLst/>
+          </a:prstGeom>
+        </p:spPr>
+      </p:pic>
+      <p:pic>
+        <p:nvPicPr>
+          <p:cNvPr id="19" name="Picture 18">
+            <a:extLst>
+              <a:ext uri="{FF2B5EF4-FFF2-40B4-BE49-F238E27FC236}">
+                <a16:creationId xmlns:a16="http://schemas.microsoft.com/office/drawing/2014/main" id="{6A273491-6524-4993-110D-ABBB88645ADA}"/>
+              </a:ext>
+            </a:extLst>
+          </p:cNvPr>
+          <p:cNvPicPr>
+            <a:picLocks noChangeAspect="1"/>
+          </p:cNvPicPr>
+          <p:nvPr/>
+        </p:nvPicPr>
+        <p:blipFill>
+          <a:blip r:embed="rId7"/>
+          <a:srcRect/>
+          <a:stretch/>
+        </p:blipFill>
+        <p:spPr>
+          <a:xfrm>
+            <a:off x="2330762" y="2411893"/>
+            <a:ext cx="2222500" cy="2336800"/>
+          </a:xfrm>
+          <a:prstGeom prst="rect">
+            <a:avLst/>
+          </a:prstGeom>
+        </p:spPr>
+      </p:pic>
+      <p:sp>
+        <p:nvSpPr>
+          <p:cNvPr id="28" name="TextBox 27">
+            <a:extLst>
+              <a:ext uri="{FF2B5EF4-FFF2-40B4-BE49-F238E27FC236}">
+                <a16:creationId xmlns:a16="http://schemas.microsoft.com/office/drawing/2014/main" id="{D0A7B58C-4B10-E803-BA19-670B48D8BC1D}"/>
+              </a:ext>
+            </a:extLst>
+          </p:cNvPr>
+          <p:cNvSpPr txBox="1"/>
+          <p:nvPr/>
+        </p:nvSpPr>
+        <p:spPr>
+          <a:xfrm>
+            <a:off x="3164431" y="2244269"/>
+            <a:ext cx="1166410" cy="276999"/>
+          </a:xfrm>
+          <a:prstGeom prst="rect">
+            <a:avLst/>
+          </a:prstGeom>
+          <a:noFill/>
+        </p:spPr>
+        <p:txBody>
+          <a:bodyPr wrap="none" rtlCol="0">
+            <a:spAutoFit/>
+          </a:bodyPr>
+          <a:lstStyle/>
+          <a:p>
+            <a:r>
+              <a:rPr lang="en-US" sz="1200" dirty="0"/>
+              <a:t>SIR, no latency</a:t>
+            </a:r>
+          </a:p>
+        </p:txBody>
+      </p:sp>
+      <p:sp>
+        <p:nvSpPr>
+          <p:cNvPr id="29" name="TextBox 28">
+            <a:extLst>
+              <a:ext uri="{FF2B5EF4-FFF2-40B4-BE49-F238E27FC236}">
+                <a16:creationId xmlns:a16="http://schemas.microsoft.com/office/drawing/2014/main" id="{7B4F0098-CBFB-5F4C-8F1B-5BDA520E7FA1}"/>
+              </a:ext>
+            </a:extLst>
+          </p:cNvPr>
+          <p:cNvSpPr txBox="1"/>
+          <p:nvPr/>
+        </p:nvSpPr>
+        <p:spPr>
+          <a:xfrm>
+            <a:off x="4567764" y="2244269"/>
+            <a:ext cx="1432380" cy="276999"/>
+          </a:xfrm>
+          <a:prstGeom prst="rect">
+            <a:avLst/>
+          </a:prstGeom>
+          <a:noFill/>
+        </p:spPr>
+        <p:txBody>
+          <a:bodyPr wrap="none" rtlCol="0">
+            <a:spAutoFit/>
+          </a:bodyPr>
+          <a:lstStyle/>
+          <a:p>
+            <a:r>
+              <a:rPr lang="en-US" sz="1200" dirty="0"/>
+              <a:t>SEIR, 1 day latency</a:t>
+            </a:r>
+          </a:p>
+        </p:txBody>
+      </p:sp>
+      <p:sp>
+        <p:nvSpPr>
+          <p:cNvPr id="30" name="TextBox 29">
+            <a:extLst>
+              <a:ext uri="{FF2B5EF4-FFF2-40B4-BE49-F238E27FC236}">
+                <a16:creationId xmlns:a16="http://schemas.microsoft.com/office/drawing/2014/main" id="{8D7EED60-0CD2-3126-F99C-49818FA474E0}"/>
+              </a:ext>
+            </a:extLst>
+          </p:cNvPr>
+          <p:cNvSpPr txBox="1"/>
+          <p:nvPr/>
+        </p:nvSpPr>
+        <p:spPr>
+          <a:xfrm>
+            <a:off x="6119022" y="2244269"/>
+            <a:ext cx="1506823" cy="276999"/>
+          </a:xfrm>
+          <a:prstGeom prst="rect">
+            <a:avLst/>
+          </a:prstGeom>
+          <a:noFill/>
+        </p:spPr>
+        <p:txBody>
+          <a:bodyPr wrap="none" rtlCol="0">
+            <a:spAutoFit/>
+          </a:bodyPr>
+          <a:lstStyle/>
+          <a:p>
+            <a:r>
+              <a:rPr lang="en-US" sz="1200" dirty="0"/>
+              <a:t>SEIR, 2 days latency</a:t>
+            </a:r>
+          </a:p>
+        </p:txBody>
+      </p:sp>
+      <p:sp>
+        <p:nvSpPr>
+          <p:cNvPr id="31" name="TextBox 30">
+            <a:extLst>
+              <a:ext uri="{FF2B5EF4-FFF2-40B4-BE49-F238E27FC236}">
+                <a16:creationId xmlns:a16="http://schemas.microsoft.com/office/drawing/2014/main" id="{C30EA3C1-154A-BB68-4B45-60EC026977F1}"/>
+              </a:ext>
+            </a:extLst>
+          </p:cNvPr>
+          <p:cNvSpPr txBox="1"/>
+          <p:nvPr/>
+        </p:nvSpPr>
+        <p:spPr>
+          <a:xfrm>
+            <a:off x="7676836" y="2244269"/>
+            <a:ext cx="1506823" cy="276999"/>
+          </a:xfrm>
+          <a:prstGeom prst="rect">
+            <a:avLst/>
+          </a:prstGeom>
+          <a:noFill/>
+        </p:spPr>
+        <p:txBody>
+          <a:bodyPr wrap="none" rtlCol="0">
+            <a:spAutoFit/>
+          </a:bodyPr>
+          <a:lstStyle/>
+          <a:p>
+            <a:r>
+              <a:rPr lang="en-US" sz="1200" dirty="0"/>
+              <a:t>SEIR, 5 days latency</a:t>
+            </a:r>
+          </a:p>
+        </p:txBody>
+      </p:sp>
+      <p:sp>
+        <p:nvSpPr>
+          <p:cNvPr id="32" name="TextBox 31">
+            <a:extLst>
+              <a:ext uri="{FF2B5EF4-FFF2-40B4-BE49-F238E27FC236}">
+                <a16:creationId xmlns:a16="http://schemas.microsoft.com/office/drawing/2014/main" id="{BF9C7286-3047-02C7-2DA8-EC77EB6FADA8}"/>
+              </a:ext>
+            </a:extLst>
+          </p:cNvPr>
+          <p:cNvSpPr txBox="1"/>
+          <p:nvPr/>
+        </p:nvSpPr>
+        <p:spPr>
+          <a:xfrm>
+            <a:off x="9221192" y="2244269"/>
+            <a:ext cx="1588576" cy="276999"/>
+          </a:xfrm>
+          <a:prstGeom prst="rect">
+            <a:avLst/>
+          </a:prstGeom>
+          <a:noFill/>
+        </p:spPr>
+        <p:txBody>
+          <a:bodyPr wrap="none" rtlCol="0">
+            <a:spAutoFit/>
+          </a:bodyPr>
+          <a:lstStyle/>
+          <a:p>
+            <a:r>
+              <a:rPr lang="en-US" sz="1200" dirty="0"/>
+              <a:t>SEIR, 10 days latency</a:t>
+            </a:r>
+          </a:p>
+        </p:txBody>
+      </p:sp>
+      <p:pic>
+        <p:nvPicPr>
+          <p:cNvPr id="33" name="Picture 32">
+            <a:extLst>
+              <a:ext uri="{FF2B5EF4-FFF2-40B4-BE49-F238E27FC236}">
+                <a16:creationId xmlns:a16="http://schemas.microsoft.com/office/drawing/2014/main" id="{38CC2C04-16E1-789F-03C9-EF7E4C4611D1}"/>
+              </a:ext>
+            </a:extLst>
+          </p:cNvPr>
+          <p:cNvPicPr>
+            <a:picLocks noChangeAspect="1"/>
+          </p:cNvPicPr>
+          <p:nvPr/>
+        </p:nvPicPr>
+        <p:blipFill>
+          <a:blip r:embed="rId8"/>
+          <a:srcRect l="37462" t="8413" r="19029" b="83645"/>
+          <a:stretch/>
+        </p:blipFill>
+        <p:spPr>
+          <a:xfrm>
+            <a:off x="9323785" y="2955851"/>
+            <a:ext cx="1194695" cy="382772"/>
+          </a:xfrm>
+          <a:prstGeom prst="rect">
+            <a:avLst/>
+          </a:prstGeom>
+        </p:spPr>
+      </p:pic>
+      <p:pic>
+        <p:nvPicPr>
+          <p:cNvPr id="34" name="Picture 33">
+            <a:extLst>
+              <a:ext uri="{FF2B5EF4-FFF2-40B4-BE49-F238E27FC236}">
+                <a16:creationId xmlns:a16="http://schemas.microsoft.com/office/drawing/2014/main" id="{96621271-16F6-FB0F-3D89-5F154576B749}"/>
+              </a:ext>
+            </a:extLst>
+          </p:cNvPr>
+          <p:cNvPicPr>
+            <a:picLocks noChangeAspect="1"/>
+          </p:cNvPicPr>
+          <p:nvPr/>
+        </p:nvPicPr>
+        <p:blipFill>
+          <a:blip r:embed="rId8"/>
+          <a:srcRect l="37462" r="19029" b="94253"/>
+          <a:stretch/>
+        </p:blipFill>
+        <p:spPr>
+          <a:xfrm>
+            <a:off x="9371707" y="2688892"/>
+            <a:ext cx="1194695" cy="276999"/>
+          </a:xfrm>
+          <a:prstGeom prst="rect">
+            <a:avLst/>
+          </a:prstGeom>
+        </p:spPr>
+      </p:pic>
+    </p:spTree>
+    <p:extLst>
+      <p:ext uri="{BB962C8B-B14F-4D97-AF65-F5344CB8AC3E}">
+        <p14:creationId xmlns:p14="http://schemas.microsoft.com/office/powerpoint/2010/main" val="3765952348"/>
+      </p:ext>
+    </p:extLst>
+  </p:cSld>
+  <p:clrMapOvr>
+    <a:masterClrMapping/>
+  </p:clrMapOvr>
+</p:sld>
+</file>
+
+<file path=ppt/slides/slide7.xml><?xml version="1.0" encoding="utf-8"?>
 <p:sld xmlns:a="http://schemas.openxmlformats.org/drawingml/2006/main" xmlns:r="http://schemas.openxmlformats.org/officeDocument/2006/relationships" xmlns:p="http://schemas.openxmlformats.org/presentationml/2006/main">
   <p:cSld>
     <p:spTree>
@@ -5251,6 +7469,35 @@
           </a:prstGeom>
         </p:spPr>
       </p:pic>
+      <p:pic>
+        <p:nvPicPr>
+          <p:cNvPr id="4" name="Picture 3">
+            <a:extLst>
+              <a:ext uri="{FF2B5EF4-FFF2-40B4-BE49-F238E27FC236}">
+                <a16:creationId xmlns:a16="http://schemas.microsoft.com/office/drawing/2014/main" id="{EEC064B9-22E4-407A-9562-B1EC164B66C1}"/>
+              </a:ext>
+            </a:extLst>
+          </p:cNvPr>
+          <p:cNvPicPr>
+            <a:picLocks noChangeAspect="1"/>
+          </p:cNvPicPr>
+          <p:nvPr/>
+        </p:nvPicPr>
+        <p:blipFill>
+          <a:blip r:embed="rId4"/>
+          <a:srcRect t="2" r="89966" b="17862"/>
+          <a:stretch/>
+        </p:blipFill>
+        <p:spPr>
+          <a:xfrm>
+            <a:off x="5974368" y="3333036"/>
+            <a:ext cx="276530" cy="1898531"/>
+          </a:xfrm>
+          <a:prstGeom prst="rect">
+            <a:avLst/>
+          </a:prstGeom>
+        </p:spPr>
+      </p:pic>
     </p:spTree>
     <p:extLst>
       <p:ext uri="{BB962C8B-B14F-4D97-AF65-F5344CB8AC3E}">
@@ -5264,7 +7511,7 @@
 </p:sld>
 </file>
 
-<file path=ppt/slides/slide5.xml><?xml version="1.0" encoding="utf-8"?>
+<file path=ppt/slides/slide8.xml><?xml version="1.0" encoding="utf-8"?>
 <p:sld xmlns:a="http://schemas.openxmlformats.org/drawingml/2006/main" xmlns:r="http://schemas.openxmlformats.org/officeDocument/2006/relationships" xmlns:p="http://schemas.openxmlformats.org/presentationml/2006/main">
   <p:cSld>
     <p:spTree>
@@ -5742,7 +7989,7 @@
 </p:sld>
 </file>
 
-<file path=ppt/slides/slide6.xml><?xml version="1.0" encoding="utf-8"?>
+<file path=ppt/slides/slide9.xml><?xml version="1.0" encoding="utf-8"?>
 <p:sld xmlns:a="http://schemas.openxmlformats.org/drawingml/2006/main" xmlns:r="http://schemas.openxmlformats.org/officeDocument/2006/relationships" xmlns:p="http://schemas.openxmlformats.org/presentationml/2006/main">
   <p:cSld>
     <p:spTree>
@@ -5750,7 +7997,7 @@
         <p:cNvPr id="1" name="">
           <a:extLst>
             <a:ext uri="{FF2B5EF4-FFF2-40B4-BE49-F238E27FC236}">
-              <a16:creationId xmlns:a16="http://schemas.microsoft.com/office/drawing/2014/main" id="{13B61283-32C2-6263-E42B-38DC6D8AB404}"/>
+              <a16:creationId xmlns:a16="http://schemas.microsoft.com/office/drawing/2014/main" id="{E6973ED1-176F-3CFE-9418-59B574C5B162}"/>
             </a:ext>
           </a:extLst>
         </p:cNvPr>
@@ -5767,10 +8014,10 @@
       </p:grpSpPr>
       <p:pic>
         <p:nvPicPr>
-          <p:cNvPr id="10" name="Picture 9">
-            <a:extLst>
-              <a:ext uri="{FF2B5EF4-FFF2-40B4-BE49-F238E27FC236}">
-                <a16:creationId xmlns:a16="http://schemas.microsoft.com/office/drawing/2014/main" id="{9EB8F711-852C-2860-B218-572A0F47CA96}"/>
+          <p:cNvPr id="23" name="Picture 22">
+            <a:extLst>
+              <a:ext uri="{FF2B5EF4-FFF2-40B4-BE49-F238E27FC236}">
+                <a16:creationId xmlns:a16="http://schemas.microsoft.com/office/drawing/2014/main" id="{F329D3F9-9BCC-69E4-49FA-B224CB42BEDF}"/>
               </a:ext>
             </a:extLst>
           </p:cNvPr>
@@ -5781,13 +8028,13 @@
         </p:nvPicPr>
         <p:blipFill>
           <a:blip r:embed="rId2"/>
-          <a:srcRect l="18922"/>
+          <a:srcRect l="265" r="10390"/>
           <a:stretch/>
         </p:blipFill>
         <p:spPr>
           <a:xfrm>
-            <a:off x="3098437" y="131426"/>
-            <a:ext cx="2399191" cy="2755900"/>
+            <a:off x="7036705" y="204729"/>
+            <a:ext cx="3287439" cy="2633472"/>
           </a:xfrm>
           <a:prstGeom prst="rect">
             <a:avLst/>
@@ -5796,10 +8043,10 @@
       </p:pic>
       <p:pic>
         <p:nvPicPr>
-          <p:cNvPr id="8" name="Picture 7">
-            <a:extLst>
-              <a:ext uri="{FF2B5EF4-FFF2-40B4-BE49-F238E27FC236}">
-                <a16:creationId xmlns:a16="http://schemas.microsoft.com/office/drawing/2014/main" id="{7166C70D-3FA5-2290-46BE-F76CD4D59C8B}"/>
+          <p:cNvPr id="12" name="Picture 11">
+            <a:extLst>
+              <a:ext uri="{FF2B5EF4-FFF2-40B4-BE49-F238E27FC236}">
+                <a16:creationId xmlns:a16="http://schemas.microsoft.com/office/drawing/2014/main" id="{2E57FF3B-E588-896E-05D2-2E5B2509F72D}"/>
               </a:ext>
             </a:extLst>
           </p:cNvPr>
@@ -5815,8 +8062,8 @@
         </p:blipFill>
         <p:spPr>
           <a:xfrm>
-            <a:off x="2439360" y="2460026"/>
-            <a:ext cx="3060700" cy="2298700"/>
+            <a:off x="257086" y="210593"/>
+            <a:ext cx="3400918" cy="2636943"/>
           </a:xfrm>
           <a:prstGeom prst="rect">
             <a:avLst/>
@@ -5825,10 +8072,10 @@
       </p:pic>
       <p:pic>
         <p:nvPicPr>
-          <p:cNvPr id="5" name="Picture 4">
-            <a:extLst>
-              <a:ext uri="{FF2B5EF4-FFF2-40B4-BE49-F238E27FC236}">
-                <a16:creationId xmlns:a16="http://schemas.microsoft.com/office/drawing/2014/main" id="{05958588-694F-21DD-690D-8F26249D2919}"/>
+          <p:cNvPr id="6" name="Picture 5">
+            <a:extLst>
+              <a:ext uri="{FF2B5EF4-FFF2-40B4-BE49-F238E27FC236}">
+                <a16:creationId xmlns:a16="http://schemas.microsoft.com/office/drawing/2014/main" id="{50EA4DB7-574E-CDED-47A9-20991E23C910}"/>
               </a:ext>
             </a:extLst>
           </p:cNvPr>
@@ -5844,8 +8091,8 @@
         </p:blipFill>
         <p:spPr>
           <a:xfrm>
-            <a:off x="2453185" y="4363750"/>
-            <a:ext cx="3035300" cy="2298700"/>
+            <a:off x="3645178" y="210689"/>
+            <a:ext cx="3400670" cy="2636751"/>
           </a:xfrm>
           <a:prstGeom prst="rect">
             <a:avLst/>
@@ -5854,10 +8101,10 @@
       </p:pic>
       <p:pic>
         <p:nvPicPr>
-          <p:cNvPr id="17" name="Picture 16">
-            <a:extLst>
-              <a:ext uri="{FF2B5EF4-FFF2-40B4-BE49-F238E27FC236}">
-                <a16:creationId xmlns:a16="http://schemas.microsoft.com/office/drawing/2014/main" id="{4B3A7207-31E3-B988-6AAC-E52D81957BDF}"/>
+          <p:cNvPr id="9" name="Picture 8">
+            <a:extLst>
+              <a:ext uri="{FF2B5EF4-FFF2-40B4-BE49-F238E27FC236}">
+                <a16:creationId xmlns:a16="http://schemas.microsoft.com/office/drawing/2014/main" id="{0E509117-C74A-620D-ECF7-290C67E7CD56}"/>
               </a:ext>
             </a:extLst>
           </p:cNvPr>
@@ -5873,8 +8120,8 @@
         </p:blipFill>
         <p:spPr>
           <a:xfrm>
-            <a:off x="157827" y="200623"/>
-            <a:ext cx="2864932" cy="2679700"/>
+            <a:off x="248319" y="2452069"/>
+            <a:ext cx="3400918" cy="2608589"/>
           </a:xfrm>
           <a:prstGeom prst="rect">
             <a:avLst/>
@@ -5883,10 +8130,10 @@
       </p:pic>
       <p:pic>
         <p:nvPicPr>
-          <p:cNvPr id="15" name="Picture 14">
-            <a:extLst>
-              <a:ext uri="{FF2B5EF4-FFF2-40B4-BE49-F238E27FC236}">
-                <a16:creationId xmlns:a16="http://schemas.microsoft.com/office/drawing/2014/main" id="{EB0225C4-4C58-B286-C583-401F17D49CAD}"/>
+          <p:cNvPr id="3" name="Picture 2">
+            <a:extLst>
+              <a:ext uri="{FF2B5EF4-FFF2-40B4-BE49-F238E27FC236}">
+                <a16:creationId xmlns:a16="http://schemas.microsoft.com/office/drawing/2014/main" id="{FCA083B0-7044-EF95-F9C2-3AB91FFA8FD9}"/>
               </a:ext>
             </a:extLst>
           </p:cNvPr>
@@ -5897,13 +8144,182 @@
         </p:nvPicPr>
         <p:blipFill>
           <a:blip r:embed="rId6"/>
-          <a:srcRect l="1187" r="1187"/>
+          <a:srcRect/>
           <a:stretch/>
         </p:blipFill>
         <p:spPr>
           <a:xfrm>
-            <a:off x="52570" y="2460026"/>
-            <a:ext cx="3060700" cy="2298700"/>
+            <a:off x="3645178" y="2431157"/>
+            <a:ext cx="3400670" cy="2636751"/>
+          </a:xfrm>
+          <a:prstGeom prst="rect">
+            <a:avLst/>
+          </a:prstGeom>
+        </p:spPr>
+      </p:pic>
+      <p:sp>
+        <p:nvSpPr>
+          <p:cNvPr id="2" name="TextBox 1">
+            <a:extLst>
+              <a:ext uri="{FF2B5EF4-FFF2-40B4-BE49-F238E27FC236}">
+                <a16:creationId xmlns:a16="http://schemas.microsoft.com/office/drawing/2014/main" id="{CD49A245-7009-0D36-53A6-2A3630084B0E}"/>
+              </a:ext>
+            </a:extLst>
+          </p:cNvPr>
+          <p:cNvSpPr txBox="1"/>
+          <p:nvPr/>
+        </p:nvSpPr>
+        <p:spPr>
+          <a:xfrm>
+            <a:off x="0" y="0"/>
+            <a:ext cx="320922" cy="369332"/>
+          </a:xfrm>
+          <a:prstGeom prst="rect">
+            <a:avLst/>
+          </a:prstGeom>
+          <a:noFill/>
+        </p:spPr>
+        <p:txBody>
+          <a:bodyPr wrap="none" rtlCol="0">
+            <a:spAutoFit/>
+          </a:bodyPr>
+          <a:lstStyle/>
+          <a:p>
+            <a:r>
+              <a:rPr lang="en-US" dirty="0"/>
+              <a:t>A</a:t>
+            </a:r>
+          </a:p>
+        </p:txBody>
+      </p:sp>
+      <p:sp>
+        <p:nvSpPr>
+          <p:cNvPr id="4" name="TextBox 3">
+            <a:extLst>
+              <a:ext uri="{FF2B5EF4-FFF2-40B4-BE49-F238E27FC236}">
+                <a16:creationId xmlns:a16="http://schemas.microsoft.com/office/drawing/2014/main" id="{63A00FD8-39A9-A84D-D598-FBC3A97DC713}"/>
+              </a:ext>
+            </a:extLst>
+          </p:cNvPr>
+          <p:cNvSpPr txBox="1"/>
+          <p:nvPr/>
+        </p:nvSpPr>
+        <p:spPr>
+          <a:xfrm>
+            <a:off x="3480371" y="0"/>
+            <a:ext cx="344966" cy="369332"/>
+          </a:xfrm>
+          <a:prstGeom prst="rect">
+            <a:avLst/>
+          </a:prstGeom>
+          <a:noFill/>
+        </p:spPr>
+        <p:txBody>
+          <a:bodyPr wrap="none" rtlCol="0">
+            <a:spAutoFit/>
+          </a:bodyPr>
+          <a:lstStyle/>
+          <a:p>
+            <a:r>
+              <a:rPr lang="en-US" dirty="0"/>
+              <a:t>C</a:t>
+            </a:r>
+          </a:p>
+        </p:txBody>
+      </p:sp>
+      <p:sp>
+        <p:nvSpPr>
+          <p:cNvPr id="5" name="TextBox 4">
+            <a:extLst>
+              <a:ext uri="{FF2B5EF4-FFF2-40B4-BE49-F238E27FC236}">
+                <a16:creationId xmlns:a16="http://schemas.microsoft.com/office/drawing/2014/main" id="{9A66E434-92C6-8396-4281-2377465336C6}"/>
+              </a:ext>
+            </a:extLst>
+          </p:cNvPr>
+          <p:cNvSpPr txBox="1"/>
+          <p:nvPr/>
+        </p:nvSpPr>
+        <p:spPr>
+          <a:xfrm>
+            <a:off x="0" y="2342119"/>
+            <a:ext cx="324128" cy="369332"/>
+          </a:xfrm>
+          <a:prstGeom prst="rect">
+            <a:avLst/>
+          </a:prstGeom>
+          <a:noFill/>
+        </p:spPr>
+        <p:txBody>
+          <a:bodyPr wrap="none" rtlCol="0">
+            <a:spAutoFit/>
+          </a:bodyPr>
+          <a:lstStyle/>
+          <a:p>
+            <a:r>
+              <a:rPr lang="en-US" dirty="0"/>
+              <a:t>B</a:t>
+            </a:r>
+          </a:p>
+        </p:txBody>
+      </p:sp>
+      <p:sp>
+        <p:nvSpPr>
+          <p:cNvPr id="7" name="TextBox 6">
+            <a:extLst>
+              <a:ext uri="{FF2B5EF4-FFF2-40B4-BE49-F238E27FC236}">
+                <a16:creationId xmlns:a16="http://schemas.microsoft.com/office/drawing/2014/main" id="{2344CE84-914B-72C9-F375-796A21057791}"/>
+              </a:ext>
+            </a:extLst>
+          </p:cNvPr>
+          <p:cNvSpPr txBox="1"/>
+          <p:nvPr/>
+        </p:nvSpPr>
+        <p:spPr>
+          <a:xfrm>
+            <a:off x="3480371" y="2334341"/>
+            <a:ext cx="343364" cy="369332"/>
+          </a:xfrm>
+          <a:prstGeom prst="rect">
+            <a:avLst/>
+          </a:prstGeom>
+          <a:noFill/>
+        </p:spPr>
+        <p:txBody>
+          <a:bodyPr wrap="none" rtlCol="0">
+            <a:spAutoFit/>
+          </a:bodyPr>
+          <a:lstStyle/>
+          <a:p>
+            <a:r>
+              <a:rPr lang="en-US" dirty="0"/>
+              <a:t>D</a:t>
+            </a:r>
+          </a:p>
+        </p:txBody>
+      </p:sp>
+      <p:pic>
+        <p:nvPicPr>
+          <p:cNvPr id="21" name="Picture 20">
+            <a:extLst>
+              <a:ext uri="{FF2B5EF4-FFF2-40B4-BE49-F238E27FC236}">
+                <a16:creationId xmlns:a16="http://schemas.microsoft.com/office/drawing/2014/main" id="{14965397-5A87-B25B-BFC7-0C8311D6C553}"/>
+              </a:ext>
+            </a:extLst>
+          </p:cNvPr>
+          <p:cNvPicPr>
+            <a:picLocks noChangeAspect="1"/>
+          </p:cNvPicPr>
+          <p:nvPr/>
+        </p:nvPicPr>
+        <p:blipFill>
+          <a:blip r:embed="rId7"/>
+          <a:srcRect t="455" r="9610" b="455"/>
+          <a:stretch/>
+        </p:blipFill>
+        <p:spPr>
+          <a:xfrm>
+            <a:off x="7035102" y="2436387"/>
+            <a:ext cx="3289042" cy="2633472"/>
           </a:xfrm>
           <a:prstGeom prst="rect">
             <a:avLst/>
@@ -5912,10 +8328,10 @@
       </p:pic>
       <p:pic>
         <p:nvPicPr>
-          <p:cNvPr id="13" name="Picture 12">
-            <a:extLst>
-              <a:ext uri="{FF2B5EF4-FFF2-40B4-BE49-F238E27FC236}">
-                <a16:creationId xmlns:a16="http://schemas.microsoft.com/office/drawing/2014/main" id="{B49CE21C-E14C-C005-E508-F9B83A1541F7}"/>
+          <p:cNvPr id="24" name="Picture 23">
+            <a:extLst>
+              <a:ext uri="{FF2B5EF4-FFF2-40B4-BE49-F238E27FC236}">
+                <a16:creationId xmlns:a16="http://schemas.microsoft.com/office/drawing/2014/main" id="{D1C2D2F8-90A1-16CB-D56F-0FC6981ED076}"/>
               </a:ext>
             </a:extLst>
           </p:cNvPr>
@@ -5925,26 +8341,55 @@
           <p:nvPr/>
         </p:nvPicPr>
         <p:blipFill>
-          <a:blip r:embed="rId7"/>
-          <a:srcRect l="1255" r="1255"/>
+          <a:blip r:embed="rId8"/>
+          <a:srcRect l="89667"/>
           <a:stretch/>
         </p:blipFill>
         <p:spPr>
           <a:xfrm>
-            <a:off x="63500" y="4358677"/>
-            <a:ext cx="3035300" cy="2298700"/>
+            <a:off x="10324144" y="2519007"/>
+            <a:ext cx="372551" cy="2633472"/>
           </a:xfrm>
           <a:prstGeom prst="rect">
             <a:avLst/>
           </a:prstGeom>
         </p:spPr>
       </p:pic>
-      <p:sp>
-        <p:nvSpPr>
-          <p:cNvPr id="18" name="TextBox 17">
-            <a:extLst>
-              <a:ext uri="{FF2B5EF4-FFF2-40B4-BE49-F238E27FC236}">
-                <a16:creationId xmlns:a16="http://schemas.microsoft.com/office/drawing/2014/main" id="{C4503B02-AD4D-2356-C5CC-9219194FB197}"/>
+      <p:pic>
+        <p:nvPicPr>
+          <p:cNvPr id="25" name="Picture 24">
+            <a:extLst>
+              <a:ext uri="{FF2B5EF4-FFF2-40B4-BE49-F238E27FC236}">
+                <a16:creationId xmlns:a16="http://schemas.microsoft.com/office/drawing/2014/main" id="{96F25BAE-D2EE-CF4D-F1A1-26A111C8E613}"/>
+              </a:ext>
+            </a:extLst>
+          </p:cNvPr>
+          <p:cNvPicPr>
+            <a:picLocks noChangeAspect="1"/>
+          </p:cNvPicPr>
+          <p:nvPr/>
+        </p:nvPicPr>
+        <p:blipFill>
+          <a:blip r:embed="rId9"/>
+          <a:srcRect l="90656" r="461" b="13791"/>
+          <a:stretch/>
+        </p:blipFill>
+        <p:spPr>
+          <a:xfrm>
+            <a:off x="10347005" y="204729"/>
+            <a:ext cx="326831" cy="2270277"/>
+          </a:xfrm>
+          <a:prstGeom prst="rect">
+            <a:avLst/>
+          </a:prstGeom>
+        </p:spPr>
+      </p:pic>
+      <p:sp>
+        <p:nvSpPr>
+          <p:cNvPr id="26" name="TextBox 25">
+            <a:extLst>
+              <a:ext uri="{FF2B5EF4-FFF2-40B4-BE49-F238E27FC236}">
+                <a16:creationId xmlns:a16="http://schemas.microsoft.com/office/drawing/2014/main" id="{A58AB661-7CA7-6192-D605-53D9C1F1790E}"/>
               </a:ext>
             </a:extLst>
           </p:cNvPr>
@@ -5953,8 +8398,8 @@
         </p:nvSpPr>
         <p:spPr>
           <a:xfrm>
-            <a:off x="708557" y="612340"/>
-            <a:ext cx="320922" cy="369332"/>
+            <a:off x="6947447" y="0"/>
+            <a:ext cx="312906" cy="369332"/>
           </a:xfrm>
           <a:prstGeom prst="rect">
             <a:avLst/>
@@ -5969,17 +8414,17 @@
           <a:p>
             <a:r>
               <a:rPr lang="en-US" dirty="0"/>
-              <a:t>A</a:t>
-            </a:r>
-          </a:p>
-        </p:txBody>
-      </p:sp>
-      <p:sp>
-        <p:nvSpPr>
-          <p:cNvPr id="19" name="TextBox 18">
-            <a:extLst>
-              <a:ext uri="{FF2B5EF4-FFF2-40B4-BE49-F238E27FC236}">
-                <a16:creationId xmlns:a16="http://schemas.microsoft.com/office/drawing/2014/main" id="{4CCEAD89-6018-045B-3074-1A513CF1D577}"/>
+              <a:t>E</a:t>
+            </a:r>
+          </a:p>
+        </p:txBody>
+      </p:sp>
+      <p:sp>
+        <p:nvSpPr>
+          <p:cNvPr id="27" name="TextBox 26">
+            <a:extLst>
+              <a:ext uri="{FF2B5EF4-FFF2-40B4-BE49-F238E27FC236}">
+                <a16:creationId xmlns:a16="http://schemas.microsoft.com/office/drawing/2014/main" id="{A116EE33-84EB-CBE8-0FBB-321A36E93631}"/>
               </a:ext>
             </a:extLst>
           </p:cNvPr>
@@ -5988,8 +8433,8 @@
         </p:nvSpPr>
         <p:spPr>
           <a:xfrm>
-            <a:off x="726677" y="2510991"/>
-            <a:ext cx="324128" cy="369332"/>
+            <a:off x="6947447" y="2334341"/>
+            <a:ext cx="306494" cy="369332"/>
           </a:xfrm>
           <a:prstGeom prst="rect">
             <a:avLst/>
@@ -6004,146 +8449,6 @@
           <a:p>
             <a:r>
               <a:rPr lang="en-US" dirty="0"/>
-              <a:t>B</a:t>
-            </a:r>
-          </a:p>
-        </p:txBody>
-      </p:sp>
-      <p:sp>
-        <p:nvSpPr>
-          <p:cNvPr id="20" name="TextBox 19">
-            <a:extLst>
-              <a:ext uri="{FF2B5EF4-FFF2-40B4-BE49-F238E27FC236}">
-                <a16:creationId xmlns:a16="http://schemas.microsoft.com/office/drawing/2014/main" id="{D73B65AE-C4E3-0C1D-8299-086CB7C5FFA3}"/>
-              </a:ext>
-            </a:extLst>
-          </p:cNvPr>
-          <p:cNvSpPr txBox="1"/>
-          <p:nvPr/>
-        </p:nvSpPr>
-        <p:spPr>
-          <a:xfrm>
-            <a:off x="708557" y="4451934"/>
-            <a:ext cx="344966" cy="369332"/>
-          </a:xfrm>
-          <a:prstGeom prst="rect">
-            <a:avLst/>
-          </a:prstGeom>
-          <a:noFill/>
-        </p:spPr>
-        <p:txBody>
-          <a:bodyPr wrap="none" rtlCol="0">
-            <a:spAutoFit/>
-          </a:bodyPr>
-          <a:lstStyle/>
-          <a:p>
-            <a:r>
-              <a:rPr lang="en-US" dirty="0"/>
-              <a:t>C</a:t>
-            </a:r>
-          </a:p>
-        </p:txBody>
-      </p:sp>
-      <p:sp>
-        <p:nvSpPr>
-          <p:cNvPr id="21" name="TextBox 20">
-            <a:extLst>
-              <a:ext uri="{FF2B5EF4-FFF2-40B4-BE49-F238E27FC236}">
-                <a16:creationId xmlns:a16="http://schemas.microsoft.com/office/drawing/2014/main" id="{5F84B059-E874-055D-D470-FD167E6489AE}"/>
-              </a:ext>
-            </a:extLst>
-          </p:cNvPr>
-          <p:cNvSpPr txBox="1"/>
-          <p:nvPr/>
-        </p:nvSpPr>
-        <p:spPr>
-          <a:xfrm>
-            <a:off x="3116726" y="619343"/>
-            <a:ext cx="343364" cy="369332"/>
-          </a:xfrm>
-          <a:prstGeom prst="rect">
-            <a:avLst/>
-          </a:prstGeom>
-          <a:noFill/>
-        </p:spPr>
-        <p:txBody>
-          <a:bodyPr wrap="none" rtlCol="0">
-            <a:spAutoFit/>
-          </a:bodyPr>
-          <a:lstStyle/>
-          <a:p>
-            <a:r>
-              <a:rPr lang="en-US" dirty="0"/>
-              <a:t>D</a:t>
-            </a:r>
-          </a:p>
-        </p:txBody>
-      </p:sp>
-      <p:sp>
-        <p:nvSpPr>
-          <p:cNvPr id="22" name="TextBox 21">
-            <a:extLst>
-              <a:ext uri="{FF2B5EF4-FFF2-40B4-BE49-F238E27FC236}">
-                <a16:creationId xmlns:a16="http://schemas.microsoft.com/office/drawing/2014/main" id="{AA8C498C-C9B1-EF1E-A638-42F208614BEE}"/>
-              </a:ext>
-            </a:extLst>
-          </p:cNvPr>
-          <p:cNvSpPr txBox="1"/>
-          <p:nvPr/>
-        </p:nvSpPr>
-        <p:spPr>
-          <a:xfrm>
-            <a:off x="3138991" y="2517994"/>
-            <a:ext cx="312906" cy="369332"/>
-          </a:xfrm>
-          <a:prstGeom prst="rect">
-            <a:avLst/>
-          </a:prstGeom>
-          <a:noFill/>
-        </p:spPr>
-        <p:txBody>
-          <a:bodyPr wrap="none" rtlCol="0">
-            <a:spAutoFit/>
-          </a:bodyPr>
-          <a:lstStyle/>
-          <a:p>
-            <a:r>
-              <a:rPr lang="en-US" dirty="0"/>
-              <a:t>E</a:t>
-            </a:r>
-          </a:p>
-        </p:txBody>
-      </p:sp>
-      <p:sp>
-        <p:nvSpPr>
-          <p:cNvPr id="23" name="TextBox 22">
-            <a:extLst>
-              <a:ext uri="{FF2B5EF4-FFF2-40B4-BE49-F238E27FC236}">
-                <a16:creationId xmlns:a16="http://schemas.microsoft.com/office/drawing/2014/main" id="{2441ECCA-AF8B-20A0-119E-9F2B3F21A37C}"/>
-              </a:ext>
-            </a:extLst>
-          </p:cNvPr>
-          <p:cNvSpPr txBox="1"/>
-          <p:nvPr/>
-        </p:nvSpPr>
-        <p:spPr>
-          <a:xfrm>
-            <a:off x="3116726" y="4445845"/>
-            <a:ext cx="306494" cy="369332"/>
-          </a:xfrm>
-          <a:prstGeom prst="rect">
-            <a:avLst/>
-          </a:prstGeom>
-          <a:noFill/>
-        </p:spPr>
-        <p:txBody>
-          <a:bodyPr wrap="none" rtlCol="0">
-            <a:spAutoFit/>
-          </a:bodyPr>
-          <a:lstStyle/>
-          <a:p>
-            <a:r>
-              <a:rPr lang="en-US" dirty="0"/>
               <a:t>F</a:t>
             </a:r>
           </a:p>
@@ -6152,171 +8457,7 @@
     </p:spTree>
     <p:extLst>
       <p:ext uri="{BB962C8B-B14F-4D97-AF65-F5344CB8AC3E}">
-        <p14:creationId xmlns:p14="http://schemas.microsoft.com/office/powerpoint/2010/main" val="3489901805"/>
-      </p:ext>
-    </p:extLst>
-  </p:cSld>
-  <p:clrMapOvr>
-    <a:masterClrMapping/>
-  </p:clrMapOvr>
-</p:sld>
-</file>
-
-<file path=ppt/slides/slide7.xml><?xml version="1.0" encoding="utf-8"?>
-<p:sld xmlns:a="http://schemas.openxmlformats.org/drawingml/2006/main" xmlns:r="http://schemas.openxmlformats.org/officeDocument/2006/relationships" xmlns:p="http://schemas.openxmlformats.org/presentationml/2006/main">
-  <p:cSld>
-    <p:spTree>
-      <p:nvGrpSpPr>
-        <p:cNvPr id="1" name="">
-          <a:extLst>
-            <a:ext uri="{FF2B5EF4-FFF2-40B4-BE49-F238E27FC236}">
-              <a16:creationId xmlns:a16="http://schemas.microsoft.com/office/drawing/2014/main" id="{ACCC8AA4-794A-DA32-1C2F-F1C6E4FBCA98}"/>
-            </a:ext>
-          </a:extLst>
-        </p:cNvPr>
-        <p:cNvGrpSpPr/>
-        <p:nvPr/>
-      </p:nvGrpSpPr>
-      <p:grpSpPr>
-        <a:xfrm>
-          <a:off x="0" y="0"/>
-          <a:ext cx="0" cy="0"/>
-          <a:chOff x="0" y="0"/>
-          <a:chExt cx="0" cy="0"/>
-        </a:xfrm>
-      </p:grpSpPr>
-      <p:pic>
-        <p:nvPicPr>
-          <p:cNvPr id="12" name="Picture 11">
-            <a:extLst>
-              <a:ext uri="{FF2B5EF4-FFF2-40B4-BE49-F238E27FC236}">
-                <a16:creationId xmlns:a16="http://schemas.microsoft.com/office/drawing/2014/main" id="{25223396-7430-70AD-CA6C-809A5F3718E0}"/>
-              </a:ext>
-            </a:extLst>
-          </p:cNvPr>
-          <p:cNvPicPr>
-            <a:picLocks noChangeAspect="1"/>
-          </p:cNvPicPr>
-          <p:nvPr/>
-        </p:nvPicPr>
-        <p:blipFill>
-          <a:blip r:embed="rId2"/>
-          <a:srcRect/>
-          <a:stretch/>
-        </p:blipFill>
-        <p:spPr>
-          <a:xfrm>
-            <a:off x="1479418" y="1242472"/>
-            <a:ext cx="3340129" cy="2555463"/>
-          </a:xfrm>
-          <a:prstGeom prst="rect">
-            <a:avLst/>
-          </a:prstGeom>
-        </p:spPr>
-      </p:pic>
-      <p:pic>
-        <p:nvPicPr>
-          <p:cNvPr id="6" name="Picture 5">
-            <a:extLst>
-              <a:ext uri="{FF2B5EF4-FFF2-40B4-BE49-F238E27FC236}">
-                <a16:creationId xmlns:a16="http://schemas.microsoft.com/office/drawing/2014/main" id="{312FCA63-538A-9CC9-E37F-76263F0A85F5}"/>
-              </a:ext>
-            </a:extLst>
-          </p:cNvPr>
-          <p:cNvPicPr>
-            <a:picLocks noChangeAspect="1"/>
-          </p:cNvPicPr>
-          <p:nvPr/>
-        </p:nvPicPr>
-        <p:blipFill>
-          <a:blip r:embed="rId3"/>
-          <a:srcRect/>
-          <a:stretch/>
-        </p:blipFill>
-        <p:spPr>
-          <a:xfrm>
-            <a:off x="4887672" y="1271984"/>
-            <a:ext cx="3262980" cy="2496438"/>
-          </a:xfrm>
-          <a:prstGeom prst="rect">
-            <a:avLst/>
-          </a:prstGeom>
-        </p:spPr>
-      </p:pic>
-      <p:sp>
-        <p:nvSpPr>
-          <p:cNvPr id="2" name="TextBox 1">
-            <a:extLst>
-              <a:ext uri="{FF2B5EF4-FFF2-40B4-BE49-F238E27FC236}">
-                <a16:creationId xmlns:a16="http://schemas.microsoft.com/office/drawing/2014/main" id="{037EC741-256B-3DF7-71CE-5687AB2C6C79}"/>
-              </a:ext>
-            </a:extLst>
-          </p:cNvPr>
-          <p:cNvSpPr txBox="1"/>
-          <p:nvPr/>
-        </p:nvSpPr>
-        <p:spPr>
-          <a:xfrm>
-            <a:off x="1347385" y="1175804"/>
-            <a:ext cx="442172" cy="369332"/>
-          </a:xfrm>
-          <a:prstGeom prst="rect">
-            <a:avLst/>
-          </a:prstGeom>
-          <a:noFill/>
-        </p:spPr>
-        <p:txBody>
-          <a:bodyPr wrap="none" rtlCol="0">
-            <a:spAutoFit/>
-          </a:bodyPr>
-          <a:lstStyle/>
-          <a:p>
-            <a:r>
-              <a:rPr lang="en-US" dirty="0"/>
-              <a:t>(a)</a:t>
-            </a:r>
-          </a:p>
-        </p:txBody>
-      </p:sp>
-      <p:sp>
-        <p:nvSpPr>
-          <p:cNvPr id="4" name="TextBox 3">
-            <a:extLst>
-              <a:ext uri="{FF2B5EF4-FFF2-40B4-BE49-F238E27FC236}">
-                <a16:creationId xmlns:a16="http://schemas.microsoft.com/office/drawing/2014/main" id="{9D1F7D43-1DC4-511A-1A31-EB9202A2ECD5}"/>
-              </a:ext>
-            </a:extLst>
-          </p:cNvPr>
-          <p:cNvSpPr txBox="1"/>
-          <p:nvPr/>
-        </p:nvSpPr>
-        <p:spPr>
-          <a:xfrm>
-            <a:off x="4732124" y="1175804"/>
-            <a:ext cx="449162" cy="369332"/>
-          </a:xfrm>
-          <a:prstGeom prst="rect">
-            <a:avLst/>
-          </a:prstGeom>
-          <a:noFill/>
-        </p:spPr>
-        <p:txBody>
-          <a:bodyPr wrap="none" rtlCol="0">
-            <a:spAutoFit/>
-          </a:bodyPr>
-          <a:lstStyle/>
-          <a:p>
-            <a:r>
-              <a:rPr lang="en-US" dirty="0"/>
-              <a:t>(b)</a:t>
-            </a:r>
-          </a:p>
-        </p:txBody>
-      </p:sp>
-    </p:spTree>
-    <p:extLst>
-      <p:ext uri="{BB962C8B-B14F-4D97-AF65-F5344CB8AC3E}">
-        <p14:creationId xmlns:p14="http://schemas.microsoft.com/office/powerpoint/2010/main" val="3526566054"/>
+        <p14:creationId xmlns:p14="http://schemas.microsoft.com/office/powerpoint/2010/main" val="323273992"/>
       </p:ext>
     </p:extLst>
   </p:cSld>

</xml_diff>